<commit_message>
LM358AD - Low-Voltage Rail-to-Rail Output Operational Amplifier
</commit_message>
<xml_diff>
--- a/Report/FuncDecomp.pptx
+++ b/Report/FuncDecomp.pptx
@@ -6,25 +6,26 @@
   </p:sldMasterIdLst>
   <p:sldIdLst>
     <p:sldId id="269" r:id="rId2"/>
-    <p:sldId id="274" r:id="rId3"/>
-    <p:sldId id="275" r:id="rId4"/>
-    <p:sldId id="270" r:id="rId5"/>
-    <p:sldId id="256" r:id="rId6"/>
-    <p:sldId id="258" r:id="rId7"/>
-    <p:sldId id="262" r:id="rId8"/>
-    <p:sldId id="263" r:id="rId9"/>
-    <p:sldId id="264" r:id="rId10"/>
-    <p:sldId id="257" r:id="rId11"/>
-    <p:sldId id="271" r:id="rId12"/>
-    <p:sldId id="272" r:id="rId13"/>
-    <p:sldId id="273" r:id="rId14"/>
-    <p:sldId id="259" r:id="rId15"/>
-    <p:sldId id="260" r:id="rId16"/>
-    <p:sldId id="266" r:id="rId17"/>
-    <p:sldId id="261" r:id="rId18"/>
-    <p:sldId id="267" r:id="rId19"/>
-    <p:sldId id="268" r:id="rId20"/>
-    <p:sldId id="265" r:id="rId21"/>
+    <p:sldId id="276" r:id="rId3"/>
+    <p:sldId id="274" r:id="rId4"/>
+    <p:sldId id="275" r:id="rId5"/>
+    <p:sldId id="270" r:id="rId6"/>
+    <p:sldId id="256" r:id="rId7"/>
+    <p:sldId id="258" r:id="rId8"/>
+    <p:sldId id="262" r:id="rId9"/>
+    <p:sldId id="263" r:id="rId10"/>
+    <p:sldId id="264" r:id="rId11"/>
+    <p:sldId id="257" r:id="rId12"/>
+    <p:sldId id="271" r:id="rId13"/>
+    <p:sldId id="272" r:id="rId14"/>
+    <p:sldId id="273" r:id="rId15"/>
+    <p:sldId id="259" r:id="rId16"/>
+    <p:sldId id="260" r:id="rId17"/>
+    <p:sldId id="266" r:id="rId18"/>
+    <p:sldId id="261" r:id="rId19"/>
+    <p:sldId id="267" r:id="rId20"/>
+    <p:sldId id="268" r:id="rId21"/>
+    <p:sldId id="265" r:id="rId22"/>
   </p:sldIdLst>
   <p:sldSz cx="9906000" cy="6858000" type="A4"/>
   <p:notesSz cx="6858000" cy="9144000"/>
@@ -3924,6 +3925,1180 @@
       </p:grpSpPr>
       <p:grpSp>
         <p:nvGrpSpPr>
+          <p:cNvPr id="56" name="Group 55">
+            <a:extLst>
+              <a:ext uri="{FF2B5EF4-FFF2-40B4-BE49-F238E27FC236}">
+                <a16:creationId xmlns:a16="http://schemas.microsoft.com/office/drawing/2014/main" id="{6EDCED04-815B-4D76-AEA5-6F8C60647ACA}"/>
+              </a:ext>
+            </a:extLst>
+          </p:cNvPr>
+          <p:cNvGrpSpPr/>
+          <p:nvPr/>
+        </p:nvGrpSpPr>
+        <p:grpSpPr>
+          <a:xfrm>
+            <a:off x="1361095" y="2943550"/>
+            <a:ext cx="3344550" cy="2635379"/>
+            <a:chOff x="1361095" y="2943550"/>
+            <a:chExt cx="3344550" cy="2635379"/>
+          </a:xfrm>
+        </p:grpSpPr>
+        <p:sp>
+          <p:nvSpPr>
+            <p:cNvPr id="4" name="Oval 3">
+              <a:extLst>
+                <a:ext uri="{FF2B5EF4-FFF2-40B4-BE49-F238E27FC236}">
+                  <a16:creationId xmlns:a16="http://schemas.microsoft.com/office/drawing/2014/main" id="{130EC464-2131-49FA-AA07-EFFA47C79029}"/>
+                </a:ext>
+              </a:extLst>
+            </p:cNvPr>
+            <p:cNvSpPr/>
+            <p:nvPr/>
+          </p:nvSpPr>
+          <p:spPr>
+            <a:xfrm>
+              <a:off x="2675570" y="3884776"/>
+              <a:ext cx="1172048" cy="1172048"/>
+            </a:xfrm>
+            <a:prstGeom prst="ellipse">
+              <a:avLst/>
+            </a:prstGeom>
+          </p:spPr>
+          <p:style>
+            <a:lnRef idx="2">
+              <a:schemeClr val="accent1">
+                <a:shade val="50000"/>
+              </a:schemeClr>
+            </a:lnRef>
+            <a:fillRef idx="1">
+              <a:schemeClr val="accent1"/>
+            </a:fillRef>
+            <a:effectRef idx="0">
+              <a:schemeClr val="accent1"/>
+            </a:effectRef>
+            <a:fontRef idx="minor">
+              <a:schemeClr val="lt1"/>
+            </a:fontRef>
+          </p:style>
+          <p:txBody>
+            <a:bodyPr rtlCol="0" anchor="ctr"/>
+            <a:lstStyle/>
+            <a:p>
+              <a:pPr algn="ctr"/>
+              <a:r>
+                <a:rPr lang="en-AU" dirty="0">
+                  <a:latin typeface="Consolas" panose="020B0609020204030204" pitchFamily="49" charset="0"/>
+                </a:rPr>
+                <a:t>A</a:t>
+              </a:r>
+            </a:p>
+          </p:txBody>
+        </p:sp>
+        <p:grpSp>
+          <p:nvGrpSpPr>
+            <p:cNvPr id="13" name="Group 12">
+              <a:extLst>
+                <a:ext uri="{FF2B5EF4-FFF2-40B4-BE49-F238E27FC236}">
+                  <a16:creationId xmlns:a16="http://schemas.microsoft.com/office/drawing/2014/main" id="{5C08818E-1B1F-45C1-AA21-CC545D8F4323}"/>
+                </a:ext>
+              </a:extLst>
+            </p:cNvPr>
+            <p:cNvGrpSpPr/>
+            <p:nvPr/>
+          </p:nvGrpSpPr>
+          <p:grpSpPr>
+            <a:xfrm>
+              <a:off x="1825645" y="3420159"/>
+              <a:ext cx="2880000" cy="1768177"/>
+              <a:chOff x="1825645" y="3420159"/>
+              <a:chExt cx="2880000" cy="1768177"/>
+            </a:xfrm>
+          </p:grpSpPr>
+          <p:sp>
+            <p:nvSpPr>
+              <p:cNvPr id="11" name="Rectangle 10">
+                <a:extLst>
+                  <a:ext uri="{FF2B5EF4-FFF2-40B4-BE49-F238E27FC236}">
+                    <a16:creationId xmlns:a16="http://schemas.microsoft.com/office/drawing/2014/main" id="{349B4208-A35A-4398-B54A-C833226FA1B1}"/>
+                  </a:ext>
+                </a:extLst>
+              </p:cNvPr>
+              <p:cNvSpPr/>
+              <p:nvPr/>
+            </p:nvSpPr>
+            <p:spPr>
+              <a:xfrm>
+                <a:off x="1825645" y="3607081"/>
+                <a:ext cx="186922" cy="1581255"/>
+              </a:xfrm>
+              <a:prstGeom prst="rect">
+                <a:avLst/>
+              </a:prstGeom>
+              <a:ln>
+                <a:noFill/>
+              </a:ln>
+            </p:spPr>
+            <p:style>
+              <a:lnRef idx="2">
+                <a:schemeClr val="dk1">
+                  <a:shade val="50000"/>
+                </a:schemeClr>
+              </a:lnRef>
+              <a:fillRef idx="1">
+                <a:schemeClr val="dk1"/>
+              </a:fillRef>
+              <a:effectRef idx="0">
+                <a:schemeClr val="dk1"/>
+              </a:effectRef>
+              <a:fontRef idx="minor">
+                <a:schemeClr val="lt1"/>
+              </a:fontRef>
+            </p:style>
+            <p:txBody>
+              <a:bodyPr rtlCol="0" anchor="ctr"/>
+              <a:lstStyle/>
+              <a:p>
+                <a:pPr algn="ctr"/>
+                <a:endParaRPr lang="en-AU" dirty="0">
+                  <a:latin typeface="Consolas" panose="020B0609020204030204" pitchFamily="49" charset="0"/>
+                </a:endParaRPr>
+              </a:p>
+            </p:txBody>
+          </p:sp>
+          <p:sp>
+            <p:nvSpPr>
+              <p:cNvPr id="27" name="Rectangle 26">
+                <a:extLst>
+                  <a:ext uri="{FF2B5EF4-FFF2-40B4-BE49-F238E27FC236}">
+                    <a16:creationId xmlns:a16="http://schemas.microsoft.com/office/drawing/2014/main" id="{BDCE1AD9-FD69-4A3F-87C5-99D1EB029A44}"/>
+                  </a:ext>
+                </a:extLst>
+              </p:cNvPr>
+              <p:cNvSpPr/>
+              <p:nvPr/>
+            </p:nvSpPr>
+            <p:spPr>
+              <a:xfrm rot="5400000">
+                <a:off x="3172184" y="2073620"/>
+                <a:ext cx="186922" cy="2880000"/>
+              </a:xfrm>
+              <a:prstGeom prst="rect">
+                <a:avLst/>
+              </a:prstGeom>
+              <a:ln>
+                <a:noFill/>
+              </a:ln>
+            </p:spPr>
+            <p:style>
+              <a:lnRef idx="2">
+                <a:schemeClr val="dk1">
+                  <a:shade val="50000"/>
+                </a:schemeClr>
+              </a:lnRef>
+              <a:fillRef idx="1">
+                <a:schemeClr val="dk1"/>
+              </a:fillRef>
+              <a:effectRef idx="0">
+                <a:schemeClr val="dk1"/>
+              </a:effectRef>
+              <a:fontRef idx="minor">
+                <a:schemeClr val="lt1"/>
+              </a:fontRef>
+            </p:style>
+            <p:txBody>
+              <a:bodyPr rtlCol="0" anchor="ctr"/>
+              <a:lstStyle/>
+              <a:p>
+                <a:pPr algn="ctr"/>
+                <a:endParaRPr lang="en-AU" dirty="0">
+                  <a:latin typeface="Consolas" panose="020B0609020204030204" pitchFamily="49" charset="0"/>
+                </a:endParaRPr>
+              </a:p>
+            </p:txBody>
+          </p:sp>
+          <p:sp>
+            <p:nvSpPr>
+              <p:cNvPr id="28" name="Rectangle 27">
+                <a:extLst>
+                  <a:ext uri="{FF2B5EF4-FFF2-40B4-BE49-F238E27FC236}">
+                    <a16:creationId xmlns:a16="http://schemas.microsoft.com/office/drawing/2014/main" id="{501D23E6-DB19-4514-A211-5E921C1BF9E4}"/>
+                  </a:ext>
+                </a:extLst>
+              </p:cNvPr>
+              <p:cNvSpPr/>
+              <p:nvPr/>
+            </p:nvSpPr>
+            <p:spPr>
+              <a:xfrm>
+                <a:off x="4518094" y="3607081"/>
+                <a:ext cx="186922" cy="1581255"/>
+              </a:xfrm>
+              <a:prstGeom prst="rect">
+                <a:avLst/>
+              </a:prstGeom>
+              <a:ln>
+                <a:noFill/>
+              </a:ln>
+            </p:spPr>
+            <p:style>
+              <a:lnRef idx="2">
+                <a:schemeClr val="dk1">
+                  <a:shade val="50000"/>
+                </a:schemeClr>
+              </a:lnRef>
+              <a:fillRef idx="1">
+                <a:schemeClr val="dk1"/>
+              </a:fillRef>
+              <a:effectRef idx="0">
+                <a:schemeClr val="dk1"/>
+              </a:effectRef>
+              <a:fontRef idx="minor">
+                <a:schemeClr val="lt1"/>
+              </a:fontRef>
+            </p:style>
+            <p:txBody>
+              <a:bodyPr rtlCol="0" anchor="ctr"/>
+              <a:lstStyle/>
+              <a:p>
+                <a:pPr algn="ctr"/>
+                <a:endParaRPr lang="en-AU" dirty="0">
+                  <a:latin typeface="Consolas" panose="020B0609020204030204" pitchFamily="49" charset="0"/>
+                </a:endParaRPr>
+              </a:p>
+            </p:txBody>
+          </p:sp>
+        </p:grpSp>
+        <p:grpSp>
+          <p:nvGrpSpPr>
+            <p:cNvPr id="26" name="Group 25">
+              <a:extLst>
+                <a:ext uri="{FF2B5EF4-FFF2-40B4-BE49-F238E27FC236}">
+                  <a16:creationId xmlns:a16="http://schemas.microsoft.com/office/drawing/2014/main" id="{5152645B-23D6-433B-AF92-3D4AAE5B7C6C}"/>
+                </a:ext>
+              </a:extLst>
+            </p:cNvPr>
+            <p:cNvGrpSpPr/>
+            <p:nvPr/>
+          </p:nvGrpSpPr>
+          <p:grpSpPr>
+            <a:xfrm>
+              <a:off x="1825645" y="3818892"/>
+              <a:ext cx="739877" cy="1369444"/>
+              <a:chOff x="1919106" y="3768744"/>
+              <a:chExt cx="653700" cy="1209938"/>
+            </a:xfrm>
+            <a:solidFill>
+              <a:srgbClr val="FF5B5B"/>
+            </a:solidFill>
+          </p:grpSpPr>
+          <p:grpSp>
+            <p:nvGrpSpPr>
+              <p:cNvPr id="12" name="Group 11">
+                <a:extLst>
+                  <a:ext uri="{FF2B5EF4-FFF2-40B4-BE49-F238E27FC236}">
+                    <a16:creationId xmlns:a16="http://schemas.microsoft.com/office/drawing/2014/main" id="{ED0C8046-293F-4374-BFA4-67ECF006A06A}"/>
+                  </a:ext>
+                </a:extLst>
+              </p:cNvPr>
+              <p:cNvGrpSpPr/>
+              <p:nvPr/>
+            </p:nvGrpSpPr>
+            <p:grpSpPr>
+              <a:xfrm>
+                <a:off x="1919106" y="3768744"/>
+                <a:ext cx="653700" cy="419310"/>
+                <a:chOff x="1346870" y="759679"/>
+                <a:chExt cx="653700" cy="419310"/>
+              </a:xfrm>
+              <a:grpFill/>
+            </p:grpSpPr>
+            <p:sp>
+              <p:nvSpPr>
+                <p:cNvPr id="18" name="Rectangle 17">
+                  <a:extLst>
+                    <a:ext uri="{FF2B5EF4-FFF2-40B4-BE49-F238E27FC236}">
+                      <a16:creationId xmlns:a16="http://schemas.microsoft.com/office/drawing/2014/main" id="{30C67930-4A5E-48AD-A72D-2F6E7DB509A1}"/>
+                    </a:ext>
+                  </a:extLst>
+                </p:cNvPr>
+                <p:cNvSpPr/>
+                <p:nvPr/>
+              </p:nvSpPr>
+              <p:spPr>
+                <a:xfrm>
+                  <a:off x="1346870" y="875874"/>
+                  <a:ext cx="186921" cy="186921"/>
+                </a:xfrm>
+                <a:prstGeom prst="rect">
+                  <a:avLst/>
+                </a:prstGeom>
+                <a:ln/>
+              </p:spPr>
+              <p:style>
+                <a:lnRef idx="2">
+                  <a:schemeClr val="accent4">
+                    <a:shade val="50000"/>
+                  </a:schemeClr>
+                </a:lnRef>
+                <a:fillRef idx="1">
+                  <a:schemeClr val="accent4"/>
+                </a:fillRef>
+                <a:effectRef idx="0">
+                  <a:schemeClr val="accent4"/>
+                </a:effectRef>
+                <a:fontRef idx="minor">
+                  <a:schemeClr val="lt1"/>
+                </a:fontRef>
+              </p:style>
+              <p:txBody>
+                <a:bodyPr rtlCol="0" anchor="ctr"/>
+                <a:lstStyle/>
+                <a:p>
+                  <a:pPr algn="ctr"/>
+                  <a:endParaRPr lang="en-AU" dirty="0">
+                    <a:latin typeface="Consolas" panose="020B0609020204030204" pitchFamily="49" charset="0"/>
+                  </a:endParaRPr>
+                </a:p>
+              </p:txBody>
+            </p:sp>
+            <p:sp>
+              <p:nvSpPr>
+                <p:cNvPr id="20" name="Isosceles Triangle 19">
+                  <a:extLst>
+                    <a:ext uri="{FF2B5EF4-FFF2-40B4-BE49-F238E27FC236}">
+                      <a16:creationId xmlns:a16="http://schemas.microsoft.com/office/drawing/2014/main" id="{72CA8F22-CAFC-4524-A447-42B68AE65B46}"/>
+                    </a:ext>
+                  </a:extLst>
+                </p:cNvPr>
+                <p:cNvSpPr/>
+                <p:nvPr/>
+              </p:nvSpPr>
+              <p:spPr>
+                <a:xfrm rot="16200000">
+                  <a:off x="1584365" y="762784"/>
+                  <a:ext cx="419310" cy="413100"/>
+                </a:xfrm>
+                <a:prstGeom prst="triangle">
+                  <a:avLst/>
+                </a:prstGeom>
+                <a:ln/>
+              </p:spPr>
+              <p:style>
+                <a:lnRef idx="2">
+                  <a:schemeClr val="accent4">
+                    <a:shade val="50000"/>
+                  </a:schemeClr>
+                </a:lnRef>
+                <a:fillRef idx="1">
+                  <a:schemeClr val="accent4"/>
+                </a:fillRef>
+                <a:effectRef idx="0">
+                  <a:schemeClr val="accent4"/>
+                </a:effectRef>
+                <a:fontRef idx="minor">
+                  <a:schemeClr val="lt1"/>
+                </a:fontRef>
+              </p:style>
+              <p:txBody>
+                <a:bodyPr rtlCol="0" anchor="ctr"/>
+                <a:lstStyle/>
+                <a:p>
+                  <a:pPr algn="ctr"/>
+                  <a:endParaRPr lang="en-AU" dirty="0">
+                    <a:latin typeface="Consolas" panose="020B0609020204030204" pitchFamily="49" charset="0"/>
+                  </a:endParaRPr>
+                </a:p>
+              </p:txBody>
+            </p:sp>
+          </p:grpSp>
+          <p:grpSp>
+            <p:nvGrpSpPr>
+              <p:cNvPr id="30" name="Group 29">
+                <a:extLst>
+                  <a:ext uri="{FF2B5EF4-FFF2-40B4-BE49-F238E27FC236}">
+                    <a16:creationId xmlns:a16="http://schemas.microsoft.com/office/drawing/2014/main" id="{1A43385A-0D68-4128-ACB9-24C75736BCBA}"/>
+                  </a:ext>
+                </a:extLst>
+              </p:cNvPr>
+              <p:cNvGrpSpPr/>
+              <p:nvPr/>
+            </p:nvGrpSpPr>
+            <p:grpSpPr>
+              <a:xfrm>
+                <a:off x="1919106" y="4559372"/>
+                <a:ext cx="653700" cy="419310"/>
+                <a:chOff x="1346870" y="759679"/>
+                <a:chExt cx="653700" cy="419310"/>
+              </a:xfrm>
+              <a:grpFill/>
+            </p:grpSpPr>
+            <p:sp>
+              <p:nvSpPr>
+                <p:cNvPr id="31" name="Rectangle 30">
+                  <a:extLst>
+                    <a:ext uri="{FF2B5EF4-FFF2-40B4-BE49-F238E27FC236}">
+                      <a16:creationId xmlns:a16="http://schemas.microsoft.com/office/drawing/2014/main" id="{592B12ED-3C60-4B33-86BE-DF1ABB4F9842}"/>
+                    </a:ext>
+                  </a:extLst>
+                </p:cNvPr>
+                <p:cNvSpPr/>
+                <p:nvPr/>
+              </p:nvSpPr>
+              <p:spPr>
+                <a:xfrm>
+                  <a:off x="1346870" y="875874"/>
+                  <a:ext cx="186921" cy="186921"/>
+                </a:xfrm>
+                <a:prstGeom prst="rect">
+                  <a:avLst/>
+                </a:prstGeom>
+                <a:ln/>
+              </p:spPr>
+              <p:style>
+                <a:lnRef idx="2">
+                  <a:schemeClr val="accent4">
+                    <a:shade val="50000"/>
+                  </a:schemeClr>
+                </a:lnRef>
+                <a:fillRef idx="1">
+                  <a:schemeClr val="accent4"/>
+                </a:fillRef>
+                <a:effectRef idx="0">
+                  <a:schemeClr val="accent4"/>
+                </a:effectRef>
+                <a:fontRef idx="minor">
+                  <a:schemeClr val="lt1"/>
+                </a:fontRef>
+              </p:style>
+              <p:txBody>
+                <a:bodyPr rtlCol="0" anchor="ctr"/>
+                <a:lstStyle/>
+                <a:p>
+                  <a:pPr algn="ctr"/>
+                  <a:endParaRPr lang="en-AU" dirty="0">
+                    <a:latin typeface="Consolas" panose="020B0609020204030204" pitchFamily="49" charset="0"/>
+                  </a:endParaRPr>
+                </a:p>
+              </p:txBody>
+            </p:sp>
+            <p:sp>
+              <p:nvSpPr>
+                <p:cNvPr id="34" name="Isosceles Triangle 33">
+                  <a:extLst>
+                    <a:ext uri="{FF2B5EF4-FFF2-40B4-BE49-F238E27FC236}">
+                      <a16:creationId xmlns:a16="http://schemas.microsoft.com/office/drawing/2014/main" id="{98C36064-C1DB-4FE5-A1E1-B727E5065E48}"/>
+                    </a:ext>
+                  </a:extLst>
+                </p:cNvPr>
+                <p:cNvSpPr/>
+                <p:nvPr/>
+              </p:nvSpPr>
+              <p:spPr>
+                <a:xfrm rot="16200000">
+                  <a:off x="1584365" y="762784"/>
+                  <a:ext cx="419310" cy="413100"/>
+                </a:xfrm>
+                <a:prstGeom prst="triangle">
+                  <a:avLst/>
+                </a:prstGeom>
+                <a:ln/>
+              </p:spPr>
+              <p:style>
+                <a:lnRef idx="2">
+                  <a:schemeClr val="accent4">
+                    <a:shade val="50000"/>
+                  </a:schemeClr>
+                </a:lnRef>
+                <a:fillRef idx="1">
+                  <a:schemeClr val="accent4"/>
+                </a:fillRef>
+                <a:effectRef idx="0">
+                  <a:schemeClr val="accent4"/>
+                </a:effectRef>
+                <a:fontRef idx="minor">
+                  <a:schemeClr val="lt1"/>
+                </a:fontRef>
+              </p:style>
+              <p:txBody>
+                <a:bodyPr rtlCol="0" anchor="ctr"/>
+                <a:lstStyle/>
+                <a:p>
+                  <a:pPr algn="ctr"/>
+                  <a:endParaRPr lang="en-AU" dirty="0">
+                    <a:latin typeface="Consolas" panose="020B0609020204030204" pitchFamily="49" charset="0"/>
+                  </a:endParaRPr>
+                </a:p>
+              </p:txBody>
+            </p:sp>
+          </p:grpSp>
+        </p:grpSp>
+        <p:grpSp>
+          <p:nvGrpSpPr>
+            <p:cNvPr id="35" name="Group 34">
+              <a:extLst>
+                <a:ext uri="{FF2B5EF4-FFF2-40B4-BE49-F238E27FC236}">
+                  <a16:creationId xmlns:a16="http://schemas.microsoft.com/office/drawing/2014/main" id="{09C03945-6A2D-4B22-B97D-767182BF8F08}"/>
+                </a:ext>
+              </a:extLst>
+            </p:cNvPr>
+            <p:cNvGrpSpPr/>
+            <p:nvPr/>
+          </p:nvGrpSpPr>
+          <p:grpSpPr>
+            <a:xfrm rot="10800000">
+              <a:off x="3965768" y="3818892"/>
+              <a:ext cx="739877" cy="1369444"/>
+              <a:chOff x="1919106" y="3768744"/>
+              <a:chExt cx="653700" cy="1209938"/>
+            </a:xfrm>
+            <a:solidFill>
+              <a:srgbClr val="FF5B5B"/>
+            </a:solidFill>
+          </p:grpSpPr>
+          <p:grpSp>
+            <p:nvGrpSpPr>
+              <p:cNvPr id="36" name="Group 35">
+                <a:extLst>
+                  <a:ext uri="{FF2B5EF4-FFF2-40B4-BE49-F238E27FC236}">
+                    <a16:creationId xmlns:a16="http://schemas.microsoft.com/office/drawing/2014/main" id="{9E5A4C94-B532-464A-8FFD-E9B9687CBB3B}"/>
+                  </a:ext>
+                </a:extLst>
+              </p:cNvPr>
+              <p:cNvGrpSpPr/>
+              <p:nvPr/>
+            </p:nvGrpSpPr>
+            <p:grpSpPr>
+              <a:xfrm>
+                <a:off x="1919106" y="3768744"/>
+                <a:ext cx="653700" cy="419310"/>
+                <a:chOff x="1346870" y="759679"/>
+                <a:chExt cx="653700" cy="419310"/>
+              </a:xfrm>
+              <a:grpFill/>
+            </p:grpSpPr>
+            <p:sp>
+              <p:nvSpPr>
+                <p:cNvPr id="40" name="Rectangle 39">
+                  <a:extLst>
+                    <a:ext uri="{FF2B5EF4-FFF2-40B4-BE49-F238E27FC236}">
+                      <a16:creationId xmlns:a16="http://schemas.microsoft.com/office/drawing/2014/main" id="{939CF1DC-D50C-49A3-8D73-8283422BCB1C}"/>
+                    </a:ext>
+                  </a:extLst>
+                </p:cNvPr>
+                <p:cNvSpPr/>
+                <p:nvPr/>
+              </p:nvSpPr>
+              <p:spPr>
+                <a:xfrm>
+                  <a:off x="1346870" y="875874"/>
+                  <a:ext cx="186921" cy="186921"/>
+                </a:xfrm>
+                <a:prstGeom prst="rect">
+                  <a:avLst/>
+                </a:prstGeom>
+                <a:ln/>
+              </p:spPr>
+              <p:style>
+                <a:lnRef idx="2">
+                  <a:schemeClr val="accent4">
+                    <a:shade val="50000"/>
+                  </a:schemeClr>
+                </a:lnRef>
+                <a:fillRef idx="1">
+                  <a:schemeClr val="accent4"/>
+                </a:fillRef>
+                <a:effectRef idx="0">
+                  <a:schemeClr val="accent4"/>
+                </a:effectRef>
+                <a:fontRef idx="minor">
+                  <a:schemeClr val="lt1"/>
+                </a:fontRef>
+              </p:style>
+              <p:txBody>
+                <a:bodyPr rtlCol="0" anchor="ctr"/>
+                <a:lstStyle/>
+                <a:p>
+                  <a:pPr algn="ctr"/>
+                  <a:endParaRPr lang="en-AU" dirty="0">
+                    <a:latin typeface="Consolas" panose="020B0609020204030204" pitchFamily="49" charset="0"/>
+                  </a:endParaRPr>
+                </a:p>
+              </p:txBody>
+            </p:sp>
+            <p:sp>
+              <p:nvSpPr>
+                <p:cNvPr id="41" name="Isosceles Triangle 40">
+                  <a:extLst>
+                    <a:ext uri="{FF2B5EF4-FFF2-40B4-BE49-F238E27FC236}">
+                      <a16:creationId xmlns:a16="http://schemas.microsoft.com/office/drawing/2014/main" id="{815C94A4-1C66-4B12-9739-C4D2013C9A95}"/>
+                    </a:ext>
+                  </a:extLst>
+                </p:cNvPr>
+                <p:cNvSpPr/>
+                <p:nvPr/>
+              </p:nvSpPr>
+              <p:spPr>
+                <a:xfrm rot="16200000">
+                  <a:off x="1584365" y="762784"/>
+                  <a:ext cx="419310" cy="413100"/>
+                </a:xfrm>
+                <a:prstGeom prst="triangle">
+                  <a:avLst/>
+                </a:prstGeom>
+                <a:ln/>
+              </p:spPr>
+              <p:style>
+                <a:lnRef idx="2">
+                  <a:schemeClr val="accent4">
+                    <a:shade val="50000"/>
+                  </a:schemeClr>
+                </a:lnRef>
+                <a:fillRef idx="1">
+                  <a:schemeClr val="accent4"/>
+                </a:fillRef>
+                <a:effectRef idx="0">
+                  <a:schemeClr val="accent4"/>
+                </a:effectRef>
+                <a:fontRef idx="minor">
+                  <a:schemeClr val="lt1"/>
+                </a:fontRef>
+              </p:style>
+              <p:txBody>
+                <a:bodyPr rtlCol="0" anchor="ctr"/>
+                <a:lstStyle/>
+                <a:p>
+                  <a:pPr algn="ctr"/>
+                  <a:endParaRPr lang="en-AU" dirty="0">
+                    <a:latin typeface="Consolas" panose="020B0609020204030204" pitchFamily="49" charset="0"/>
+                  </a:endParaRPr>
+                </a:p>
+              </p:txBody>
+            </p:sp>
+          </p:grpSp>
+          <p:grpSp>
+            <p:nvGrpSpPr>
+              <p:cNvPr id="37" name="Group 36">
+                <a:extLst>
+                  <a:ext uri="{FF2B5EF4-FFF2-40B4-BE49-F238E27FC236}">
+                    <a16:creationId xmlns:a16="http://schemas.microsoft.com/office/drawing/2014/main" id="{A9D589EF-24E1-49C0-9603-345D6FC9F734}"/>
+                  </a:ext>
+                </a:extLst>
+              </p:cNvPr>
+              <p:cNvGrpSpPr/>
+              <p:nvPr/>
+            </p:nvGrpSpPr>
+            <p:grpSpPr>
+              <a:xfrm>
+                <a:off x="1919106" y="4559372"/>
+                <a:ext cx="653700" cy="419310"/>
+                <a:chOff x="1346870" y="759679"/>
+                <a:chExt cx="653700" cy="419310"/>
+              </a:xfrm>
+              <a:grpFill/>
+            </p:grpSpPr>
+            <p:sp>
+              <p:nvSpPr>
+                <p:cNvPr id="38" name="Rectangle 37">
+                  <a:extLst>
+                    <a:ext uri="{FF2B5EF4-FFF2-40B4-BE49-F238E27FC236}">
+                      <a16:creationId xmlns:a16="http://schemas.microsoft.com/office/drawing/2014/main" id="{826F25DA-C9AB-4E3E-9EBB-027D6D26FD0A}"/>
+                    </a:ext>
+                  </a:extLst>
+                </p:cNvPr>
+                <p:cNvSpPr/>
+                <p:nvPr/>
+              </p:nvSpPr>
+              <p:spPr>
+                <a:xfrm>
+                  <a:off x="1346870" y="875874"/>
+                  <a:ext cx="186921" cy="186921"/>
+                </a:xfrm>
+                <a:prstGeom prst="rect">
+                  <a:avLst/>
+                </a:prstGeom>
+                <a:ln/>
+              </p:spPr>
+              <p:style>
+                <a:lnRef idx="2">
+                  <a:schemeClr val="accent4">
+                    <a:shade val="50000"/>
+                  </a:schemeClr>
+                </a:lnRef>
+                <a:fillRef idx="1">
+                  <a:schemeClr val="accent4"/>
+                </a:fillRef>
+                <a:effectRef idx="0">
+                  <a:schemeClr val="accent4"/>
+                </a:effectRef>
+                <a:fontRef idx="minor">
+                  <a:schemeClr val="lt1"/>
+                </a:fontRef>
+              </p:style>
+              <p:txBody>
+                <a:bodyPr rtlCol="0" anchor="ctr"/>
+                <a:lstStyle/>
+                <a:p>
+                  <a:pPr algn="ctr"/>
+                  <a:endParaRPr lang="en-AU" dirty="0">
+                    <a:latin typeface="Consolas" panose="020B0609020204030204" pitchFamily="49" charset="0"/>
+                  </a:endParaRPr>
+                </a:p>
+              </p:txBody>
+            </p:sp>
+            <p:sp>
+              <p:nvSpPr>
+                <p:cNvPr id="39" name="Isosceles Triangle 38">
+                  <a:extLst>
+                    <a:ext uri="{FF2B5EF4-FFF2-40B4-BE49-F238E27FC236}">
+                      <a16:creationId xmlns:a16="http://schemas.microsoft.com/office/drawing/2014/main" id="{C1AE108F-BDF9-47B4-8D7B-26CA6AF044C5}"/>
+                    </a:ext>
+                  </a:extLst>
+                </p:cNvPr>
+                <p:cNvSpPr/>
+                <p:nvPr/>
+              </p:nvSpPr>
+              <p:spPr>
+                <a:xfrm rot="16200000">
+                  <a:off x="1584365" y="762784"/>
+                  <a:ext cx="419310" cy="413100"/>
+                </a:xfrm>
+                <a:prstGeom prst="triangle">
+                  <a:avLst/>
+                </a:prstGeom>
+                <a:ln/>
+              </p:spPr>
+              <p:style>
+                <a:lnRef idx="2">
+                  <a:schemeClr val="accent4">
+                    <a:shade val="50000"/>
+                  </a:schemeClr>
+                </a:lnRef>
+                <a:fillRef idx="1">
+                  <a:schemeClr val="accent4"/>
+                </a:fillRef>
+                <a:effectRef idx="0">
+                  <a:schemeClr val="accent4"/>
+                </a:effectRef>
+                <a:fontRef idx="minor">
+                  <a:schemeClr val="lt1"/>
+                </a:fontRef>
+              </p:style>
+              <p:txBody>
+                <a:bodyPr rtlCol="0" anchor="ctr"/>
+                <a:lstStyle/>
+                <a:p>
+                  <a:pPr algn="ctr"/>
+                  <a:endParaRPr lang="en-AU" dirty="0">
+                    <a:latin typeface="Consolas" panose="020B0609020204030204" pitchFamily="49" charset="0"/>
+                  </a:endParaRPr>
+                </a:p>
+              </p:txBody>
+            </p:sp>
+          </p:grpSp>
+        </p:grpSp>
+        <p:sp>
+          <p:nvSpPr>
+            <p:cNvPr id="29" name="TextBox 28">
+              <a:extLst>
+                <a:ext uri="{FF2B5EF4-FFF2-40B4-BE49-F238E27FC236}">
+                  <a16:creationId xmlns:a16="http://schemas.microsoft.com/office/drawing/2014/main" id="{3150B98B-8C81-452C-AA92-7CF5CF0CD7C1}"/>
+                </a:ext>
+              </a:extLst>
+            </p:cNvPr>
+            <p:cNvSpPr txBox="1"/>
+            <p:nvPr/>
+          </p:nvSpPr>
+          <p:spPr>
+            <a:xfrm>
+              <a:off x="1857717" y="3093221"/>
+              <a:ext cx="309700" cy="369332"/>
+            </a:xfrm>
+            <a:prstGeom prst="rect">
+              <a:avLst/>
+            </a:prstGeom>
+            <a:noFill/>
+          </p:spPr>
+          <p:txBody>
+            <a:bodyPr wrap="none" rtlCol="0">
+              <a:spAutoFit/>
+            </a:bodyPr>
+            <a:lstStyle/>
+            <a:p>
+              <a:r>
+                <a:rPr lang="en-AU" dirty="0">
+                  <a:latin typeface="Consolas" panose="020B0609020204030204" pitchFamily="49" charset="0"/>
+                </a:rPr>
+                <a:t>B</a:t>
+              </a:r>
+            </a:p>
+          </p:txBody>
+        </p:sp>
+        <p:sp>
+          <p:nvSpPr>
+            <p:cNvPr id="42" name="TextBox 41">
+              <a:extLst>
+                <a:ext uri="{FF2B5EF4-FFF2-40B4-BE49-F238E27FC236}">
+                  <a16:creationId xmlns:a16="http://schemas.microsoft.com/office/drawing/2014/main" id="{77D88D7C-9178-4E20-A226-7F43C3846302}"/>
+                </a:ext>
+              </a:extLst>
+            </p:cNvPr>
+            <p:cNvSpPr txBox="1"/>
+            <p:nvPr/>
+          </p:nvSpPr>
+          <p:spPr>
+            <a:xfrm>
+              <a:off x="1361095" y="4286134"/>
+              <a:ext cx="309700" cy="369332"/>
+            </a:xfrm>
+            <a:prstGeom prst="rect">
+              <a:avLst/>
+            </a:prstGeom>
+            <a:noFill/>
+          </p:spPr>
+          <p:txBody>
+            <a:bodyPr wrap="none" rtlCol="0">
+              <a:spAutoFit/>
+            </a:bodyPr>
+            <a:lstStyle/>
+            <a:p>
+              <a:r>
+                <a:rPr lang="en-AU" dirty="0">
+                  <a:latin typeface="Consolas" panose="020B0609020204030204" pitchFamily="49" charset="0"/>
+                </a:rPr>
+                <a:t>C</a:t>
+              </a:r>
+            </a:p>
+          </p:txBody>
+        </p:sp>
+        <p:sp>
+          <p:nvSpPr>
+            <p:cNvPr id="43" name="TextBox 42">
+              <a:extLst>
+                <a:ext uri="{FF2B5EF4-FFF2-40B4-BE49-F238E27FC236}">
+                  <a16:creationId xmlns:a16="http://schemas.microsoft.com/office/drawing/2014/main" id="{6B612215-E38D-4B0F-9FED-D70565E6AFDF}"/>
+                </a:ext>
+              </a:extLst>
+            </p:cNvPr>
+            <p:cNvSpPr txBox="1"/>
+            <p:nvPr/>
+          </p:nvSpPr>
+          <p:spPr>
+            <a:xfrm>
+              <a:off x="3106744" y="5209597"/>
+              <a:ext cx="311304" cy="369332"/>
+            </a:xfrm>
+            <a:prstGeom prst="rect">
+              <a:avLst/>
+            </a:prstGeom>
+            <a:noFill/>
+          </p:spPr>
+          <p:txBody>
+            <a:bodyPr wrap="none" rtlCol="0">
+              <a:spAutoFit/>
+            </a:bodyPr>
+            <a:lstStyle/>
+            <a:p>
+              <a:r>
+                <a:rPr lang="en-AU" dirty="0">
+                  <a:latin typeface="Consolas" panose="020B0609020204030204" pitchFamily="49" charset="0"/>
+                </a:rPr>
+                <a:t>D</a:t>
+              </a:r>
+            </a:p>
+          </p:txBody>
+        </p:sp>
+        <p:sp>
+          <p:nvSpPr>
+            <p:cNvPr id="44" name="TextBox 43">
+              <a:extLst>
+                <a:ext uri="{FF2B5EF4-FFF2-40B4-BE49-F238E27FC236}">
+                  <a16:creationId xmlns:a16="http://schemas.microsoft.com/office/drawing/2014/main" id="{F8B091E5-AD1E-422B-B227-8EAC66BF0862}"/>
+                </a:ext>
+              </a:extLst>
+            </p:cNvPr>
+            <p:cNvSpPr txBox="1"/>
+            <p:nvPr/>
+          </p:nvSpPr>
+          <p:spPr>
+            <a:xfrm>
+              <a:off x="3418048" y="2943550"/>
+              <a:ext cx="311304" cy="369332"/>
+            </a:xfrm>
+            <a:prstGeom prst="rect">
+              <a:avLst/>
+            </a:prstGeom>
+            <a:noFill/>
+          </p:spPr>
+          <p:txBody>
+            <a:bodyPr wrap="none" rtlCol="0">
+              <a:spAutoFit/>
+            </a:bodyPr>
+            <a:lstStyle/>
+            <a:p>
+              <a:r>
+                <a:rPr lang="en-AU" dirty="0">
+                  <a:latin typeface="Consolas" panose="020B0609020204030204" pitchFamily="49" charset="0"/>
+                </a:rPr>
+                <a:t>F</a:t>
+              </a:r>
+            </a:p>
+          </p:txBody>
+        </p:sp>
+        <p:sp>
+          <p:nvSpPr>
+            <p:cNvPr id="45" name="Oval 44">
+              <a:extLst>
+                <a:ext uri="{FF2B5EF4-FFF2-40B4-BE49-F238E27FC236}">
+                  <a16:creationId xmlns:a16="http://schemas.microsoft.com/office/drawing/2014/main" id="{AEF49F6A-603A-43E8-96B7-63CCAC054862}"/>
+                </a:ext>
+              </a:extLst>
+            </p:cNvPr>
+            <p:cNvSpPr/>
+            <p:nvPr/>
+          </p:nvSpPr>
+          <p:spPr>
+            <a:xfrm>
+              <a:off x="3080963" y="3076629"/>
+              <a:ext cx="378895" cy="378895"/>
+            </a:xfrm>
+            <a:prstGeom prst="ellipse">
+              <a:avLst/>
+            </a:prstGeom>
+            <a:solidFill>
+              <a:schemeClr val="tx1"/>
+            </a:solidFill>
+            <a:ln>
+              <a:noFill/>
+            </a:ln>
+          </p:spPr>
+          <p:style>
+            <a:lnRef idx="2">
+              <a:schemeClr val="accent1">
+                <a:shade val="50000"/>
+              </a:schemeClr>
+            </a:lnRef>
+            <a:fillRef idx="1">
+              <a:schemeClr val="accent1"/>
+            </a:fillRef>
+            <a:effectRef idx="0">
+              <a:schemeClr val="accent1"/>
+            </a:effectRef>
+            <a:fontRef idx="minor">
+              <a:schemeClr val="lt1"/>
+            </a:fontRef>
+          </p:style>
+          <p:txBody>
+            <a:bodyPr rtlCol="0" anchor="ctr"/>
+            <a:lstStyle/>
+            <a:p>
+              <a:pPr algn="ctr"/>
+              <a:endParaRPr lang="en-AU" dirty="0">
+                <a:latin typeface="Consolas" panose="020B0609020204030204" pitchFamily="49" charset="0"/>
+              </a:endParaRPr>
+            </a:p>
+          </p:txBody>
+        </p:sp>
+        <p:cxnSp>
+          <p:nvCxnSpPr>
+            <p:cNvPr id="47" name="Connector: Elbow 46">
+              <a:extLst>
+                <a:ext uri="{FF2B5EF4-FFF2-40B4-BE49-F238E27FC236}">
+                  <a16:creationId xmlns:a16="http://schemas.microsoft.com/office/drawing/2014/main" id="{A19063E1-0473-44A0-8EF6-3B1A80230128}"/>
+                </a:ext>
+              </a:extLst>
+            </p:cNvPr>
+            <p:cNvCxnSpPr>
+              <a:stCxn id="42" idx="0"/>
+              <a:endCxn id="18" idx="1"/>
+            </p:cNvCxnSpPr>
+            <p:nvPr/>
+          </p:nvCxnSpPr>
+          <p:spPr>
+            <a:xfrm rot="5400000" flipH="1" flipV="1">
+              <a:off x="1555822" y="4016311"/>
+              <a:ext cx="229947" cy="309700"/>
+            </a:xfrm>
+            <a:prstGeom prst="bentConnector2">
+              <a:avLst/>
+            </a:prstGeom>
+            <a:ln>
+              <a:tailEnd type="triangle"/>
+            </a:ln>
+          </p:spPr>
+          <p:style>
+            <a:lnRef idx="3">
+              <a:schemeClr val="accent2"/>
+            </a:lnRef>
+            <a:fillRef idx="0">
+              <a:schemeClr val="accent2"/>
+            </a:fillRef>
+            <a:effectRef idx="2">
+              <a:schemeClr val="accent2"/>
+            </a:effectRef>
+            <a:fontRef idx="minor">
+              <a:schemeClr val="tx1"/>
+            </a:fontRef>
+          </p:style>
+        </p:cxnSp>
+        <p:cxnSp>
+          <p:nvCxnSpPr>
+            <p:cNvPr id="49" name="Connector: Elbow 48">
+              <a:extLst>
+                <a:ext uri="{FF2B5EF4-FFF2-40B4-BE49-F238E27FC236}">
+                  <a16:creationId xmlns:a16="http://schemas.microsoft.com/office/drawing/2014/main" id="{6688A659-5AA7-4D2C-8548-8D8E7D672A64}"/>
+                </a:ext>
+              </a:extLst>
+            </p:cNvPr>
+            <p:cNvCxnSpPr>
+              <a:stCxn id="42" idx="2"/>
+              <a:endCxn id="31" idx="1"/>
+            </p:cNvCxnSpPr>
+            <p:nvPr/>
+          </p:nvCxnSpPr>
+          <p:spPr>
+            <a:xfrm rot="16200000" flipH="1">
+              <a:off x="1523007" y="4648404"/>
+              <a:ext cx="295577" cy="309700"/>
+            </a:xfrm>
+            <a:prstGeom prst="bentConnector2">
+              <a:avLst/>
+            </a:prstGeom>
+            <a:ln>
+              <a:tailEnd type="triangle"/>
+            </a:ln>
+          </p:spPr>
+          <p:style>
+            <a:lnRef idx="3">
+              <a:schemeClr val="accent2"/>
+            </a:lnRef>
+            <a:fillRef idx="0">
+              <a:schemeClr val="accent2"/>
+            </a:fillRef>
+            <a:effectRef idx="2">
+              <a:schemeClr val="accent2"/>
+            </a:effectRef>
+            <a:fontRef idx="minor">
+              <a:schemeClr val="tx1"/>
+            </a:fontRef>
+          </p:style>
+        </p:cxnSp>
+        <p:cxnSp>
+          <p:nvCxnSpPr>
+            <p:cNvPr id="53" name="Connector: Elbow 52">
+              <a:extLst>
+                <a:ext uri="{FF2B5EF4-FFF2-40B4-BE49-F238E27FC236}">
+                  <a16:creationId xmlns:a16="http://schemas.microsoft.com/office/drawing/2014/main" id="{FDE4D337-8D98-4F5A-B7DC-6A18DF0853C9}"/>
+                </a:ext>
+              </a:extLst>
+            </p:cNvPr>
+            <p:cNvCxnSpPr>
+              <a:stCxn id="43" idx="1"/>
+              <a:endCxn id="34" idx="1"/>
+            </p:cNvCxnSpPr>
+            <p:nvPr/>
+          </p:nvCxnSpPr>
+          <p:spPr>
+            <a:xfrm rot="10800000">
+              <a:off x="2331744" y="5069691"/>
+              <a:ext cx="775000" cy="324573"/>
+            </a:xfrm>
+            <a:prstGeom prst="bentConnector2">
+              <a:avLst/>
+            </a:prstGeom>
+            <a:ln>
+              <a:tailEnd type="triangle"/>
+            </a:ln>
+          </p:spPr>
+          <p:style>
+            <a:lnRef idx="3">
+              <a:schemeClr val="accent2"/>
+            </a:lnRef>
+            <a:fillRef idx="0">
+              <a:schemeClr val="accent2"/>
+            </a:fillRef>
+            <a:effectRef idx="2">
+              <a:schemeClr val="accent2"/>
+            </a:effectRef>
+            <a:fontRef idx="minor">
+              <a:schemeClr val="tx1"/>
+            </a:fontRef>
+          </p:style>
+        </p:cxnSp>
+        <p:cxnSp>
+          <p:nvCxnSpPr>
+            <p:cNvPr id="55" name="Connector: Elbow 54">
+              <a:extLst>
+                <a:ext uri="{FF2B5EF4-FFF2-40B4-BE49-F238E27FC236}">
+                  <a16:creationId xmlns:a16="http://schemas.microsoft.com/office/drawing/2014/main" id="{3E95FB2F-4E49-42DF-8AB0-21FA61304F3B}"/>
+                </a:ext>
+              </a:extLst>
+            </p:cNvPr>
+            <p:cNvCxnSpPr>
+              <a:stCxn id="43" idx="3"/>
+              <a:endCxn id="41" idx="5"/>
+            </p:cNvCxnSpPr>
+            <p:nvPr/>
+          </p:nvCxnSpPr>
+          <p:spPr>
+            <a:xfrm flipV="1">
+              <a:off x="3418048" y="5069690"/>
+              <a:ext cx="781499" cy="324573"/>
+            </a:xfrm>
+            <a:prstGeom prst="bentConnector2">
+              <a:avLst/>
+            </a:prstGeom>
+            <a:ln>
+              <a:tailEnd type="triangle"/>
+            </a:ln>
+          </p:spPr>
+          <p:style>
+            <a:lnRef idx="3">
+              <a:schemeClr val="accent2"/>
+            </a:lnRef>
+            <a:fillRef idx="0">
+              <a:schemeClr val="accent2"/>
+            </a:fillRef>
+            <a:effectRef idx="2">
+              <a:schemeClr val="accent2"/>
+            </a:effectRef>
+            <a:fontRef idx="minor">
+              <a:schemeClr val="tx1"/>
+            </a:fontRef>
+          </p:style>
+        </p:cxnSp>
+      </p:grpSp>
+    </p:spTree>
+    <p:extLst>
+      <p:ext uri="{BB962C8B-B14F-4D97-AF65-F5344CB8AC3E}">
+        <p14:creationId xmlns:p14="http://schemas.microsoft.com/office/powerpoint/2010/main" val="1276795312"/>
+      </p:ext>
+    </p:extLst>
+  </p:cSld>
+  <p:clrMapOvr>
+    <a:masterClrMapping/>
+  </p:clrMapOvr>
+</p:sld>
+</file>
+
+<file path=ppt/slides/slide11.xml><?xml version="1.0" encoding="utf-8"?>
+<p:sld xmlns:a="http://schemas.openxmlformats.org/drawingml/2006/main" xmlns:r="http://schemas.openxmlformats.org/officeDocument/2006/relationships" xmlns:p="http://schemas.openxmlformats.org/presentationml/2006/main">
+  <p:cSld>
+    <p:spTree>
+      <p:nvGrpSpPr>
+        <p:cNvPr id="1" name=""/>
+        <p:cNvGrpSpPr/>
+        <p:nvPr/>
+      </p:nvGrpSpPr>
+      <p:grpSpPr>
+        <a:xfrm>
+          <a:off x="0" y="0"/>
+          <a:ext cx="0" cy="0"/>
+          <a:chOff x="0" y="0"/>
+          <a:chExt cx="0" cy="0"/>
+        </a:xfrm>
+      </p:grpSpPr>
+      <p:grpSp>
+        <p:nvGrpSpPr>
           <p:cNvPr id="2" name="Group 1">
             <a:extLst>
               <a:ext uri="{FF2B5EF4-FFF2-40B4-BE49-F238E27FC236}">
@@ -6195,7 +7370,7 @@
 </p:sld>
 </file>
 
-<file path=ppt/slides/slide11.xml><?xml version="1.0" encoding="utf-8"?>
+<file path=ppt/slides/slide12.xml><?xml version="1.0" encoding="utf-8"?>
 <p:sld xmlns:a="http://schemas.openxmlformats.org/drawingml/2006/main" xmlns:r="http://schemas.openxmlformats.org/officeDocument/2006/relationships" xmlns:p="http://schemas.openxmlformats.org/presentationml/2006/main">
   <p:cSld>
     <p:spTree>
@@ -10363,7 +11538,7 @@
 </p:sld>
 </file>
 
-<file path=ppt/slides/slide12.xml><?xml version="1.0" encoding="utf-8"?>
+<file path=ppt/slides/slide13.xml><?xml version="1.0" encoding="utf-8"?>
 <p:sld xmlns:a="http://schemas.openxmlformats.org/drawingml/2006/main" xmlns:r="http://schemas.openxmlformats.org/officeDocument/2006/relationships" xmlns:p="http://schemas.openxmlformats.org/presentationml/2006/main">
   <p:cSld>
     <p:spTree>
@@ -12521,7 +13696,7 @@
 </p:sld>
 </file>
 
-<file path=ppt/slides/slide13.xml><?xml version="1.0" encoding="utf-8"?>
+<file path=ppt/slides/slide14.xml><?xml version="1.0" encoding="utf-8"?>
 <p:sld xmlns:a="http://schemas.openxmlformats.org/drawingml/2006/main" xmlns:r="http://schemas.openxmlformats.org/officeDocument/2006/relationships" xmlns:p="http://schemas.openxmlformats.org/presentationml/2006/main">
   <p:cSld>
     <p:spTree>
@@ -15374,7 +16549,7 @@
 </p:sld>
 </file>
 
-<file path=ppt/slides/slide14.xml><?xml version="1.0" encoding="utf-8"?>
+<file path=ppt/slides/slide15.xml><?xml version="1.0" encoding="utf-8"?>
 <p:sld xmlns:a="http://schemas.openxmlformats.org/drawingml/2006/main" xmlns:r="http://schemas.openxmlformats.org/officeDocument/2006/relationships" xmlns:p="http://schemas.openxmlformats.org/presentationml/2006/main">
   <p:cSld>
     <p:spTree>
@@ -16792,7 +17967,7 @@
 </p:sld>
 </file>
 
-<file path=ppt/slides/slide15.xml><?xml version="1.0" encoding="utf-8"?>
+<file path=ppt/slides/slide16.xml><?xml version="1.0" encoding="utf-8"?>
 <p:sld xmlns:a="http://schemas.openxmlformats.org/drawingml/2006/main" xmlns:r="http://schemas.openxmlformats.org/officeDocument/2006/relationships" xmlns:p="http://schemas.openxmlformats.org/presentationml/2006/main">
   <p:cSld>
     <p:spTree>
@@ -18244,7 +19419,7 @@
 </p:sld>
 </file>
 
-<file path=ppt/slides/slide16.xml><?xml version="1.0" encoding="utf-8"?>
+<file path=ppt/slides/slide17.xml><?xml version="1.0" encoding="utf-8"?>
 <p:sld xmlns:a="http://schemas.openxmlformats.org/drawingml/2006/main" xmlns:r="http://schemas.openxmlformats.org/officeDocument/2006/relationships" xmlns:p="http://schemas.openxmlformats.org/presentationml/2006/main">
   <p:cSld>
     <p:spTree>
@@ -19718,7 +20893,7 @@
 </p:sld>
 </file>
 
-<file path=ppt/slides/slide17.xml><?xml version="1.0" encoding="utf-8"?>
+<file path=ppt/slides/slide18.xml><?xml version="1.0" encoding="utf-8"?>
 <p:sld xmlns:a="http://schemas.openxmlformats.org/drawingml/2006/main" xmlns:r="http://schemas.openxmlformats.org/officeDocument/2006/relationships" xmlns:p="http://schemas.openxmlformats.org/presentationml/2006/main">
   <p:cSld>
     <p:spTree>
@@ -21914,7 +23089,7 @@
 </p:sld>
 </file>
 
-<file path=ppt/slides/slide18.xml><?xml version="1.0" encoding="utf-8"?>
+<file path=ppt/slides/slide19.xml><?xml version="1.0" encoding="utf-8"?>
 <p:sld xmlns:a="http://schemas.openxmlformats.org/drawingml/2006/main" xmlns:r="http://schemas.openxmlformats.org/officeDocument/2006/relationships" xmlns:p="http://schemas.openxmlformats.org/presentationml/2006/main">
   <p:cSld>
     <p:spTree>
@@ -23222,7 +24397,701 @@
 </p:sld>
 </file>
 
-<file path=ppt/slides/slide19.xml><?xml version="1.0" encoding="utf-8"?>
+<file path=ppt/slides/slide2.xml><?xml version="1.0" encoding="utf-8"?>
+<p:sld xmlns:a="http://schemas.openxmlformats.org/drawingml/2006/main" xmlns:r="http://schemas.openxmlformats.org/officeDocument/2006/relationships" xmlns:p="http://schemas.openxmlformats.org/presentationml/2006/main">
+  <p:cSld>
+    <p:spTree>
+      <p:nvGrpSpPr>
+        <p:cNvPr id="1" name=""/>
+        <p:cNvGrpSpPr/>
+        <p:nvPr/>
+      </p:nvGrpSpPr>
+      <p:grpSpPr>
+        <a:xfrm>
+          <a:off x="0" y="0"/>
+          <a:ext cx="0" cy="0"/>
+          <a:chOff x="0" y="0"/>
+          <a:chExt cx="0" cy="0"/>
+        </a:xfrm>
+      </p:grpSpPr>
+      <p:sp>
+        <p:nvSpPr>
+          <p:cNvPr id="4" name="Isosceles Triangle 3">
+            <a:extLst>
+              <a:ext uri="{FF2B5EF4-FFF2-40B4-BE49-F238E27FC236}">
+                <a16:creationId xmlns:a16="http://schemas.microsoft.com/office/drawing/2014/main" id="{459E2B35-D626-4EEA-8E72-9B0AE27EB6FE}"/>
+              </a:ext>
+            </a:extLst>
+          </p:cNvPr>
+          <p:cNvSpPr/>
+          <p:nvPr/>
+        </p:nvSpPr>
+        <p:spPr>
+          <a:xfrm rot="5400000">
+            <a:off x="4126161" y="2188721"/>
+            <a:ext cx="1542842" cy="1330036"/>
+          </a:xfrm>
+          <a:prstGeom prst="triangle">
+            <a:avLst/>
+          </a:prstGeom>
+          <a:ln w="28575"/>
+        </p:spPr>
+        <p:style>
+          <a:lnRef idx="2">
+            <a:schemeClr val="dk1"/>
+          </a:lnRef>
+          <a:fillRef idx="1">
+            <a:schemeClr val="lt1"/>
+          </a:fillRef>
+          <a:effectRef idx="0">
+            <a:schemeClr val="dk1"/>
+          </a:effectRef>
+          <a:fontRef idx="minor">
+            <a:schemeClr val="dk1"/>
+          </a:fontRef>
+        </p:style>
+        <p:txBody>
+          <a:bodyPr rtlCol="0" anchor="ctr"/>
+          <a:lstStyle/>
+          <a:p>
+            <a:pPr algn="ctr"/>
+            <a:endParaRPr lang="en-AU" sz="1600">
+              <a:solidFill>
+                <a:schemeClr val="accent2"/>
+              </a:solidFill>
+              <a:latin typeface="Consolas" panose="020B0609020204030204" pitchFamily="49" charset="0"/>
+            </a:endParaRPr>
+          </a:p>
+        </p:txBody>
+      </p:sp>
+      <p:grpSp>
+        <p:nvGrpSpPr>
+          <p:cNvPr id="35" name="Group 34">
+            <a:extLst>
+              <a:ext uri="{FF2B5EF4-FFF2-40B4-BE49-F238E27FC236}">
+                <a16:creationId xmlns:a16="http://schemas.microsoft.com/office/drawing/2014/main" id="{54930EDA-6E3D-4F6A-8BC4-9E67DF1C2248}"/>
+              </a:ext>
+            </a:extLst>
+          </p:cNvPr>
+          <p:cNvGrpSpPr/>
+          <p:nvPr/>
+        </p:nvGrpSpPr>
+        <p:grpSpPr>
+          <a:xfrm>
+            <a:off x="4232564" y="2163783"/>
+            <a:ext cx="410690" cy="1379910"/>
+            <a:chOff x="4232564" y="2299749"/>
+            <a:chExt cx="410690" cy="1379910"/>
+          </a:xfrm>
+        </p:grpSpPr>
+        <p:sp>
+          <p:nvSpPr>
+            <p:cNvPr id="5" name="TextBox 4">
+              <a:extLst>
+                <a:ext uri="{FF2B5EF4-FFF2-40B4-BE49-F238E27FC236}">
+                  <a16:creationId xmlns:a16="http://schemas.microsoft.com/office/drawing/2014/main" id="{66512A11-D9B6-4947-B892-DA1134D95238}"/>
+                </a:ext>
+              </a:extLst>
+            </p:cNvPr>
+            <p:cNvSpPr txBox="1"/>
+            <p:nvPr/>
+          </p:nvSpPr>
+          <p:spPr>
+            <a:xfrm>
+              <a:off x="4232564" y="2299749"/>
+              <a:ext cx="410690" cy="584775"/>
+            </a:xfrm>
+            <a:prstGeom prst="rect">
+              <a:avLst/>
+            </a:prstGeom>
+            <a:noFill/>
+          </p:spPr>
+          <p:txBody>
+            <a:bodyPr wrap="none" rtlCol="0">
+              <a:spAutoFit/>
+            </a:bodyPr>
+            <a:lstStyle/>
+            <a:p>
+              <a:r>
+                <a:rPr lang="en-AU" sz="3200" dirty="0">
+                  <a:solidFill>
+                    <a:schemeClr val="accent2"/>
+                  </a:solidFill>
+                  <a:latin typeface="Consolas" panose="020B0609020204030204" pitchFamily="49" charset="0"/>
+                </a:rPr>
+                <a:t>+</a:t>
+              </a:r>
+            </a:p>
+          </p:txBody>
+        </p:sp>
+        <p:sp>
+          <p:nvSpPr>
+            <p:cNvPr id="6" name="TextBox 5">
+              <a:extLst>
+                <a:ext uri="{FF2B5EF4-FFF2-40B4-BE49-F238E27FC236}">
+                  <a16:creationId xmlns:a16="http://schemas.microsoft.com/office/drawing/2014/main" id="{15E64E94-B41A-445F-AB73-2D2E5F495AA3}"/>
+                </a:ext>
+              </a:extLst>
+            </p:cNvPr>
+            <p:cNvSpPr txBox="1"/>
+            <p:nvPr/>
+          </p:nvSpPr>
+          <p:spPr>
+            <a:xfrm>
+              <a:off x="4232564" y="3094884"/>
+              <a:ext cx="410690" cy="584775"/>
+            </a:xfrm>
+            <a:prstGeom prst="rect">
+              <a:avLst/>
+            </a:prstGeom>
+            <a:noFill/>
+          </p:spPr>
+          <p:txBody>
+            <a:bodyPr wrap="none" rtlCol="0">
+              <a:spAutoFit/>
+            </a:bodyPr>
+            <a:lstStyle/>
+            <a:p>
+              <a:r>
+                <a:rPr lang="en-AU" sz="3200" dirty="0">
+                  <a:solidFill>
+                    <a:schemeClr val="accent2"/>
+                  </a:solidFill>
+                  <a:latin typeface="Consolas" panose="020B0609020204030204" pitchFamily="49" charset="0"/>
+                </a:rPr>
+                <a:t>-</a:t>
+              </a:r>
+            </a:p>
+          </p:txBody>
+        </p:sp>
+      </p:grpSp>
+      <mc:AlternateContent xmlns:mc="http://schemas.openxmlformats.org/markup-compatibility/2006">
+        <mc:Choice xmlns:a14="http://schemas.microsoft.com/office/drawing/2010/main" Requires="a14">
+          <p:sp>
+            <p:nvSpPr>
+              <p:cNvPr id="7" name="TextBox 6">
+                <a:extLst>
+                  <a:ext uri="{FF2B5EF4-FFF2-40B4-BE49-F238E27FC236}">
+                    <a16:creationId xmlns:a16="http://schemas.microsoft.com/office/drawing/2014/main" id="{DC8F5F76-0C74-48D9-87FD-DC8225A4F6DD}"/>
+                  </a:ext>
+                </a:extLst>
+              </p:cNvPr>
+              <p:cNvSpPr txBox="1"/>
+              <p:nvPr/>
+            </p:nvSpPr>
+            <p:spPr>
+              <a:xfrm>
+                <a:off x="2963635" y="2145861"/>
+                <a:ext cx="559640" cy="338554"/>
+              </a:xfrm>
+              <a:prstGeom prst="rect">
+                <a:avLst/>
+              </a:prstGeom>
+              <a:noFill/>
+            </p:spPr>
+            <p:txBody>
+              <a:bodyPr wrap="none" rtlCol="0">
+                <a:spAutoFit/>
+              </a:bodyPr>
+              <a:lstStyle/>
+              <a:p>
+                <a14:m>
+                  <m:oMathPara xmlns:m="http://schemas.openxmlformats.org/officeDocument/2006/math">
+                    <m:oMathParaPr>
+                      <m:jc m:val="centerGroup"/>
+                    </m:oMathParaPr>
+                    <m:oMath xmlns:m="http://schemas.openxmlformats.org/officeDocument/2006/math">
+                      <m:sSub>
+                        <m:sSubPr>
+                          <m:ctrlPr>
+                            <a:rPr lang="en-AU" sz="1600" b="0" i="1" smtClean="0">
+                              <a:solidFill>
+                                <a:schemeClr val="accent2"/>
+                              </a:solidFill>
+                              <a:latin typeface="Cambria Math" panose="02040503050406030204" pitchFamily="18" charset="0"/>
+                            </a:rPr>
+                          </m:ctrlPr>
+                        </m:sSubPr>
+                        <m:e>
+                          <m:r>
+                            <a:rPr lang="en-AU" sz="1600" b="0" i="1" smtClean="0">
+                              <a:solidFill>
+                                <a:schemeClr val="accent2"/>
+                              </a:solidFill>
+                              <a:latin typeface="Cambria Math" panose="02040503050406030204" pitchFamily="18" charset="0"/>
+                            </a:rPr>
+                            <m:t>𝑉</m:t>
+                          </m:r>
+                        </m:e>
+                        <m:sub>
+                          <m:r>
+                            <a:rPr lang="en-AU" sz="1600" b="0" i="1" smtClean="0">
+                              <a:solidFill>
+                                <a:schemeClr val="accent2"/>
+                              </a:solidFill>
+                              <a:latin typeface="Cambria Math" panose="02040503050406030204" pitchFamily="18" charset="0"/>
+                            </a:rPr>
+                            <m:t>𝑖𝑛</m:t>
+                          </m:r>
+                        </m:sub>
+                      </m:sSub>
+                    </m:oMath>
+                  </m:oMathPara>
+                </a14:m>
+                <a:endParaRPr lang="en-AU" sz="1600" b="0" dirty="0">
+                  <a:solidFill>
+                    <a:schemeClr val="accent2"/>
+                  </a:solidFill>
+                  <a:latin typeface="Consolas" panose="020B0609020204030204" pitchFamily="49" charset="0"/>
+                </a:endParaRPr>
+              </a:p>
+            </p:txBody>
+          </p:sp>
+        </mc:Choice>
+        <mc:Fallback>
+          <p:sp>
+            <p:nvSpPr>
+              <p:cNvPr id="7" name="TextBox 6">
+                <a:extLst>
+                  <a:ext uri="{FF2B5EF4-FFF2-40B4-BE49-F238E27FC236}">
+                    <a16:creationId xmlns:a16="http://schemas.microsoft.com/office/drawing/2014/main" id="{DC8F5F76-0C74-48D9-87FD-DC8225A4F6DD}"/>
+                  </a:ext>
+                </a:extLst>
+              </p:cNvPr>
+              <p:cNvSpPr txBox="1">
+                <a:spLocks noRot="1" noChangeAspect="1" noMove="1" noResize="1" noEditPoints="1" noAdjustHandles="1" noChangeArrowheads="1" noChangeShapeType="1" noTextEdit="1"/>
+              </p:cNvSpPr>
+              <p:nvPr/>
+            </p:nvSpPr>
+            <p:spPr>
+              <a:xfrm>
+                <a:off x="2963635" y="2145861"/>
+                <a:ext cx="559640" cy="338554"/>
+              </a:xfrm>
+              <a:prstGeom prst="rect">
+                <a:avLst/>
+              </a:prstGeom>
+              <a:blipFill>
+                <a:blip r:embed="rId2"/>
+                <a:stretch>
+                  <a:fillRect/>
+                </a:stretch>
+              </a:blipFill>
+            </p:spPr>
+            <p:txBody>
+              <a:bodyPr/>
+              <a:lstStyle/>
+              <a:p>
+                <a:r>
+                  <a:rPr lang="en-AU">
+                    <a:noFill/>
+                  </a:rPr>
+                  <a:t> </a:t>
+                </a:r>
+              </a:p>
+            </p:txBody>
+          </p:sp>
+        </mc:Fallback>
+      </mc:AlternateContent>
+      <mc:AlternateContent xmlns:mc="http://schemas.openxmlformats.org/markup-compatibility/2006">
+        <mc:Choice xmlns:a14="http://schemas.microsoft.com/office/drawing/2010/main" Requires="a14">
+          <p:sp>
+            <p:nvSpPr>
+              <p:cNvPr id="8" name="TextBox 7">
+                <a:extLst>
+                  <a:ext uri="{FF2B5EF4-FFF2-40B4-BE49-F238E27FC236}">
+                    <a16:creationId xmlns:a16="http://schemas.microsoft.com/office/drawing/2014/main" id="{09B972CD-93BB-451B-B400-A0D78FEB8E4A}"/>
+                  </a:ext>
+                </a:extLst>
+              </p:cNvPr>
+              <p:cNvSpPr txBox="1"/>
+              <p:nvPr/>
+            </p:nvSpPr>
+            <p:spPr>
+              <a:xfrm>
+                <a:off x="6711043" y="2520603"/>
+                <a:ext cx="662104" cy="338554"/>
+              </a:xfrm>
+              <a:prstGeom prst="rect">
+                <a:avLst/>
+              </a:prstGeom>
+              <a:noFill/>
+            </p:spPr>
+            <p:txBody>
+              <a:bodyPr wrap="none" rtlCol="0">
+                <a:spAutoFit/>
+              </a:bodyPr>
+              <a:lstStyle/>
+              <a:p>
+                <a14:m>
+                  <m:oMathPara xmlns:m="http://schemas.openxmlformats.org/officeDocument/2006/math">
+                    <m:oMathParaPr>
+                      <m:jc m:val="centerGroup"/>
+                    </m:oMathParaPr>
+                    <m:oMath xmlns:m="http://schemas.openxmlformats.org/officeDocument/2006/math">
+                      <m:sSub>
+                        <m:sSubPr>
+                          <m:ctrlPr>
+                            <a:rPr lang="en-AU" sz="1600" b="0" i="1" smtClean="0">
+                              <a:solidFill>
+                                <a:schemeClr val="accent2"/>
+                              </a:solidFill>
+                              <a:latin typeface="Cambria Math" panose="02040503050406030204" pitchFamily="18" charset="0"/>
+                            </a:rPr>
+                          </m:ctrlPr>
+                        </m:sSubPr>
+                        <m:e>
+                          <m:r>
+                            <a:rPr lang="en-AU" sz="1600" b="0" i="1" smtClean="0">
+                              <a:solidFill>
+                                <a:schemeClr val="accent2"/>
+                              </a:solidFill>
+                              <a:latin typeface="Cambria Math" panose="02040503050406030204" pitchFamily="18" charset="0"/>
+                            </a:rPr>
+                            <m:t>𝑉</m:t>
+                          </m:r>
+                        </m:e>
+                        <m:sub>
+                          <m:r>
+                            <a:rPr lang="en-AU" sz="1600" b="0" i="1" smtClean="0">
+                              <a:solidFill>
+                                <a:schemeClr val="accent2"/>
+                              </a:solidFill>
+                              <a:latin typeface="Cambria Math" panose="02040503050406030204" pitchFamily="18" charset="0"/>
+                            </a:rPr>
+                            <m:t>𝑜𝑢𝑡</m:t>
+                          </m:r>
+                        </m:sub>
+                      </m:sSub>
+                    </m:oMath>
+                  </m:oMathPara>
+                </a14:m>
+                <a:endParaRPr lang="en-AU" sz="1600" b="0" dirty="0">
+                  <a:solidFill>
+                    <a:schemeClr val="accent2"/>
+                  </a:solidFill>
+                  <a:latin typeface="Consolas" panose="020B0609020204030204" pitchFamily="49" charset="0"/>
+                </a:endParaRPr>
+              </a:p>
+            </p:txBody>
+          </p:sp>
+        </mc:Choice>
+        <mc:Fallback>
+          <p:sp>
+            <p:nvSpPr>
+              <p:cNvPr id="8" name="TextBox 7">
+                <a:extLst>
+                  <a:ext uri="{FF2B5EF4-FFF2-40B4-BE49-F238E27FC236}">
+                    <a16:creationId xmlns:a16="http://schemas.microsoft.com/office/drawing/2014/main" id="{09B972CD-93BB-451B-B400-A0D78FEB8E4A}"/>
+                  </a:ext>
+                </a:extLst>
+              </p:cNvPr>
+              <p:cNvSpPr txBox="1">
+                <a:spLocks noRot="1" noChangeAspect="1" noMove="1" noResize="1" noEditPoints="1" noAdjustHandles="1" noChangeArrowheads="1" noChangeShapeType="1" noTextEdit="1"/>
+              </p:cNvSpPr>
+              <p:nvPr/>
+            </p:nvSpPr>
+            <p:spPr>
+              <a:xfrm>
+                <a:off x="6711043" y="2520603"/>
+                <a:ext cx="662104" cy="338554"/>
+              </a:xfrm>
+              <a:prstGeom prst="rect">
+                <a:avLst/>
+              </a:prstGeom>
+              <a:blipFill>
+                <a:blip r:embed="rId3"/>
+                <a:stretch>
+                  <a:fillRect/>
+                </a:stretch>
+              </a:blipFill>
+            </p:spPr>
+            <p:txBody>
+              <a:bodyPr/>
+              <a:lstStyle/>
+              <a:p>
+                <a:r>
+                  <a:rPr lang="en-AU">
+                    <a:noFill/>
+                  </a:rPr>
+                  <a:t> </a:t>
+                </a:r>
+              </a:p>
+            </p:txBody>
+          </p:sp>
+        </mc:Fallback>
+      </mc:AlternateContent>
+      <p:cxnSp>
+        <p:nvCxnSpPr>
+          <p:cNvPr id="10" name="Straight Connector 9">
+            <a:extLst>
+              <a:ext uri="{FF2B5EF4-FFF2-40B4-BE49-F238E27FC236}">
+                <a16:creationId xmlns:a16="http://schemas.microsoft.com/office/drawing/2014/main" id="{D693760D-ED11-4BA8-88C9-A2622DCED0A8}"/>
+              </a:ext>
+            </a:extLst>
+          </p:cNvPr>
+          <p:cNvCxnSpPr>
+            <a:cxnSpLocks/>
+            <a:stCxn id="4" idx="0"/>
+          </p:cNvCxnSpPr>
+          <p:nvPr/>
+        </p:nvCxnSpPr>
+        <p:spPr>
+          <a:xfrm>
+            <a:off x="5562600" y="2853739"/>
+            <a:ext cx="1553936" cy="0"/>
+          </a:xfrm>
+          <a:prstGeom prst="line">
+            <a:avLst/>
+          </a:prstGeom>
+          <a:ln w="28575"/>
+        </p:spPr>
+        <p:style>
+          <a:lnRef idx="2">
+            <a:schemeClr val="dk1"/>
+          </a:lnRef>
+          <a:fillRef idx="1">
+            <a:schemeClr val="lt1"/>
+          </a:fillRef>
+          <a:effectRef idx="0">
+            <a:schemeClr val="dk1"/>
+          </a:effectRef>
+          <a:fontRef idx="minor">
+            <a:schemeClr val="dk1"/>
+          </a:fontRef>
+        </p:style>
+      </p:cxnSp>
+      <p:cxnSp>
+        <p:nvCxnSpPr>
+          <p:cNvPr id="23" name="Straight Connector 22">
+            <a:extLst>
+              <a:ext uri="{FF2B5EF4-FFF2-40B4-BE49-F238E27FC236}">
+                <a16:creationId xmlns:a16="http://schemas.microsoft.com/office/drawing/2014/main" id="{AF638F94-7701-4273-9A7B-F0BA02A33BDF}"/>
+              </a:ext>
+            </a:extLst>
+          </p:cNvPr>
+          <p:cNvCxnSpPr/>
+          <p:nvPr/>
+        </p:nvCxnSpPr>
+        <p:spPr>
+          <a:xfrm flipH="1">
+            <a:off x="3152565" y="2468028"/>
+            <a:ext cx="1080000" cy="0"/>
+          </a:xfrm>
+          <a:prstGeom prst="line">
+            <a:avLst/>
+          </a:prstGeom>
+          <a:ln w="28575"/>
+        </p:spPr>
+        <p:style>
+          <a:lnRef idx="2">
+            <a:schemeClr val="dk1"/>
+          </a:lnRef>
+          <a:fillRef idx="1">
+            <a:schemeClr val="lt1"/>
+          </a:fillRef>
+          <a:effectRef idx="0">
+            <a:schemeClr val="dk1"/>
+          </a:effectRef>
+          <a:fontRef idx="minor">
+            <a:schemeClr val="dk1"/>
+          </a:fontRef>
+        </p:style>
+      </p:cxnSp>
+      <p:cxnSp>
+        <p:nvCxnSpPr>
+          <p:cNvPr id="24" name="Straight Connector 23">
+            <a:extLst>
+              <a:ext uri="{FF2B5EF4-FFF2-40B4-BE49-F238E27FC236}">
+                <a16:creationId xmlns:a16="http://schemas.microsoft.com/office/drawing/2014/main" id="{0217CC9A-FDE7-4A07-8A14-177A59280831}"/>
+              </a:ext>
+            </a:extLst>
+          </p:cNvPr>
+          <p:cNvCxnSpPr/>
+          <p:nvPr/>
+        </p:nvCxnSpPr>
+        <p:spPr>
+          <a:xfrm flipH="1">
+            <a:off x="3152565" y="3239449"/>
+            <a:ext cx="1080000" cy="0"/>
+          </a:xfrm>
+          <a:prstGeom prst="line">
+            <a:avLst/>
+          </a:prstGeom>
+          <a:ln w="28575"/>
+        </p:spPr>
+        <p:style>
+          <a:lnRef idx="2">
+            <a:schemeClr val="dk1"/>
+          </a:lnRef>
+          <a:fillRef idx="1">
+            <a:schemeClr val="lt1"/>
+          </a:fillRef>
+          <a:effectRef idx="0">
+            <a:schemeClr val="dk1"/>
+          </a:effectRef>
+          <a:fontRef idx="minor">
+            <a:schemeClr val="dk1"/>
+          </a:fontRef>
+        </p:style>
+      </p:cxnSp>
+      <p:sp>
+        <p:nvSpPr>
+          <p:cNvPr id="25" name="Rectangle 24">
+            <a:extLst>
+              <a:ext uri="{FF2B5EF4-FFF2-40B4-BE49-F238E27FC236}">
+                <a16:creationId xmlns:a16="http://schemas.microsoft.com/office/drawing/2014/main" id="{8E008B2B-D7E2-4076-93EE-86187F9FF0ED}"/>
+              </a:ext>
+            </a:extLst>
+          </p:cNvPr>
+          <p:cNvSpPr/>
+          <p:nvPr/>
+        </p:nvSpPr>
+        <p:spPr>
+          <a:xfrm>
+            <a:off x="3119499" y="2468028"/>
+            <a:ext cx="66130" cy="771421"/>
+          </a:xfrm>
+          <a:prstGeom prst="rect">
+            <a:avLst/>
+          </a:prstGeom>
+          <a:noFill/>
+          <a:ln>
+            <a:noFill/>
+          </a:ln>
+        </p:spPr>
+        <p:style>
+          <a:lnRef idx="2">
+            <a:schemeClr val="accent1">
+              <a:shade val="50000"/>
+            </a:schemeClr>
+          </a:lnRef>
+          <a:fillRef idx="1">
+            <a:schemeClr val="accent1"/>
+          </a:fillRef>
+          <a:effectRef idx="0">
+            <a:schemeClr val="accent1"/>
+          </a:effectRef>
+          <a:fontRef idx="minor">
+            <a:schemeClr val="lt1"/>
+          </a:fontRef>
+        </p:style>
+        <p:txBody>
+          <a:bodyPr rtlCol="0" anchor="ctr"/>
+          <a:lstStyle/>
+          <a:p>
+            <a:pPr algn="ctr"/>
+            <a:endParaRPr lang="en-AU" sz="2000"/>
+          </a:p>
+        </p:txBody>
+      </p:sp>
+      <p:sp>
+        <p:nvSpPr>
+          <p:cNvPr id="27" name="Rectangle 26">
+            <a:extLst>
+              <a:ext uri="{FF2B5EF4-FFF2-40B4-BE49-F238E27FC236}">
+                <a16:creationId xmlns:a16="http://schemas.microsoft.com/office/drawing/2014/main" id="{334E081A-9541-4D30-9B60-2A231FBF8EB2}"/>
+              </a:ext>
+            </a:extLst>
+          </p:cNvPr>
+          <p:cNvSpPr/>
+          <p:nvPr/>
+        </p:nvSpPr>
+        <p:spPr>
+          <a:xfrm>
+            <a:off x="6609535" y="2082317"/>
+            <a:ext cx="66130" cy="771421"/>
+          </a:xfrm>
+          <a:prstGeom prst="rect">
+            <a:avLst/>
+          </a:prstGeom>
+          <a:noFill/>
+          <a:ln>
+            <a:noFill/>
+          </a:ln>
+        </p:spPr>
+        <p:style>
+          <a:lnRef idx="2">
+            <a:schemeClr val="accent1">
+              <a:shade val="50000"/>
+            </a:schemeClr>
+          </a:lnRef>
+          <a:fillRef idx="1">
+            <a:schemeClr val="accent1"/>
+          </a:fillRef>
+          <a:effectRef idx="0">
+            <a:schemeClr val="accent1"/>
+          </a:effectRef>
+          <a:fontRef idx="minor">
+            <a:schemeClr val="lt1"/>
+          </a:fontRef>
+        </p:style>
+        <p:txBody>
+          <a:bodyPr rtlCol="0" anchor="ctr"/>
+          <a:lstStyle/>
+          <a:p>
+            <a:pPr algn="ctr"/>
+            <a:endParaRPr lang="en-AU" sz="2000"/>
+          </a:p>
+        </p:txBody>
+      </p:sp>
+      <p:cxnSp>
+        <p:nvCxnSpPr>
+          <p:cNvPr id="29" name="Connector: Elbow 28">
+            <a:extLst>
+              <a:ext uri="{FF2B5EF4-FFF2-40B4-BE49-F238E27FC236}">
+                <a16:creationId xmlns:a16="http://schemas.microsoft.com/office/drawing/2014/main" id="{4BB7E7AB-4979-42E5-8F6D-B45FE43ED06F}"/>
+              </a:ext>
+            </a:extLst>
+          </p:cNvPr>
+          <p:cNvCxnSpPr>
+            <a:cxnSpLocks/>
+            <a:stCxn id="25" idx="2"/>
+            <a:endCxn id="27" idx="2"/>
+          </p:cNvCxnSpPr>
+          <p:nvPr/>
+        </p:nvCxnSpPr>
+        <p:spPr>
+          <a:xfrm rot="5400000" flipH="1" flipV="1">
+            <a:off x="4704726" y="1301576"/>
+            <a:ext cx="385711" cy="3490036"/>
+          </a:xfrm>
+          <a:prstGeom prst="bentConnector3">
+            <a:avLst>
+              <a:gd name="adj1" fmla="val -142524"/>
+            </a:avLst>
+          </a:prstGeom>
+          <a:ln w="28575"/>
+        </p:spPr>
+        <p:style>
+          <a:lnRef idx="2">
+            <a:schemeClr val="dk1"/>
+          </a:lnRef>
+          <a:fillRef idx="1">
+            <a:schemeClr val="lt1"/>
+          </a:fillRef>
+          <a:effectRef idx="0">
+            <a:schemeClr val="dk1"/>
+          </a:effectRef>
+          <a:fontRef idx="minor">
+            <a:schemeClr val="dk1"/>
+          </a:fontRef>
+        </p:style>
+      </p:cxnSp>
+    </p:spTree>
+    <p:extLst>
+      <p:ext uri="{BB962C8B-B14F-4D97-AF65-F5344CB8AC3E}">
+        <p14:creationId xmlns:p14="http://schemas.microsoft.com/office/powerpoint/2010/main" val="555293544"/>
+      </p:ext>
+    </p:extLst>
+  </p:cSld>
+  <p:clrMapOvr>
+    <a:masterClrMapping/>
+  </p:clrMapOvr>
+</p:sld>
+</file>
+
+<file path=ppt/slides/slide20.xml><?xml version="1.0" encoding="utf-8"?>
 <p:sld xmlns:a="http://schemas.openxmlformats.org/drawingml/2006/main" xmlns:r="http://schemas.openxmlformats.org/officeDocument/2006/relationships" xmlns:p="http://schemas.openxmlformats.org/presentationml/2006/main">
   <p:cSld>
     <p:spTree>
@@ -24656,7 +26525,37 @@
 </p:sld>
 </file>
 
-<file path=ppt/slides/slide2.xml><?xml version="1.0" encoding="utf-8"?>
+<file path=ppt/slides/slide21.xml><?xml version="1.0" encoding="utf-8"?>
+<p:sld xmlns:a="http://schemas.openxmlformats.org/drawingml/2006/main" xmlns:r="http://schemas.openxmlformats.org/officeDocument/2006/relationships" xmlns:p="http://schemas.openxmlformats.org/presentationml/2006/main">
+  <p:cSld>
+    <p:spTree>
+      <p:nvGrpSpPr>
+        <p:cNvPr id="1" name=""/>
+        <p:cNvGrpSpPr/>
+        <p:nvPr/>
+      </p:nvGrpSpPr>
+      <p:grpSpPr>
+        <a:xfrm>
+          <a:off x="0" y="0"/>
+          <a:ext cx="0" cy="0"/>
+          <a:chOff x="0" y="0"/>
+          <a:chExt cx="0" cy="0"/>
+        </a:xfrm>
+      </p:grpSpPr>
+    </p:spTree>
+    <p:extLst>
+      <p:ext uri="{BB962C8B-B14F-4D97-AF65-F5344CB8AC3E}">
+        <p14:creationId xmlns:p14="http://schemas.microsoft.com/office/powerpoint/2010/main" val="3555961788"/>
+      </p:ext>
+    </p:extLst>
+  </p:cSld>
+  <p:clrMapOvr>
+    <a:masterClrMapping/>
+  </p:clrMapOvr>
+</p:sld>
+</file>
+
+<file path=ppt/slides/slide3.xml><?xml version="1.0" encoding="utf-8"?>
 <p:sld xmlns:a="http://schemas.openxmlformats.org/drawingml/2006/main" xmlns:r="http://schemas.openxmlformats.org/officeDocument/2006/relationships" xmlns:p="http://schemas.openxmlformats.org/presentationml/2006/main">
   <p:cSld>
     <p:spTree>
@@ -26558,7 +28457,7 @@
         </p:nvGrpSpPr>
         <p:grpSpPr>
           <a:xfrm>
-            <a:off x="428363" y="2665623"/>
+            <a:off x="127149" y="4184572"/>
             <a:ext cx="9155156" cy="1413423"/>
             <a:chOff x="256597" y="4231387"/>
             <a:chExt cx="9155156" cy="1413423"/>
@@ -27331,37 +29230,7 @@
 </p:sld>
 </file>
 
-<file path=ppt/slides/slide20.xml><?xml version="1.0" encoding="utf-8"?>
-<p:sld xmlns:a="http://schemas.openxmlformats.org/drawingml/2006/main" xmlns:r="http://schemas.openxmlformats.org/officeDocument/2006/relationships" xmlns:p="http://schemas.openxmlformats.org/presentationml/2006/main">
-  <p:cSld>
-    <p:spTree>
-      <p:nvGrpSpPr>
-        <p:cNvPr id="1" name=""/>
-        <p:cNvGrpSpPr/>
-        <p:nvPr/>
-      </p:nvGrpSpPr>
-      <p:grpSpPr>
-        <a:xfrm>
-          <a:off x="0" y="0"/>
-          <a:ext cx="0" cy="0"/>
-          <a:chOff x="0" y="0"/>
-          <a:chExt cx="0" cy="0"/>
-        </a:xfrm>
-      </p:grpSpPr>
-    </p:spTree>
-    <p:extLst>
-      <p:ext uri="{BB962C8B-B14F-4D97-AF65-F5344CB8AC3E}">
-        <p14:creationId xmlns:p14="http://schemas.microsoft.com/office/powerpoint/2010/main" val="3555961788"/>
-      </p:ext>
-    </p:extLst>
-  </p:cSld>
-  <p:clrMapOvr>
-    <a:masterClrMapping/>
-  </p:clrMapOvr>
-</p:sld>
-</file>
-
-<file path=ppt/slides/slide3.xml><?xml version="1.0" encoding="utf-8"?>
+<file path=ppt/slides/slide4.xml><?xml version="1.0" encoding="utf-8"?>
 <p:sld xmlns:a="http://schemas.openxmlformats.org/drawingml/2006/main" xmlns:r="http://schemas.openxmlformats.org/officeDocument/2006/relationships" xmlns:p="http://schemas.openxmlformats.org/presentationml/2006/main">
   <p:cSld>
     <p:spTree>
@@ -27398,8 +29267,8 @@
             <a:chExt cx="9155156" cy="2980403"/>
           </a:xfrm>
         </p:grpSpPr>
-        <mc:AlternateContent xmlns:mc="http://schemas.openxmlformats.org/markup-compatibility/2006">
-          <mc:Choice xmlns:a14="http://schemas.microsoft.com/office/drawing/2010/main" Requires="a14">
+        <mc:AlternateContent xmlns:mc="http://schemas.openxmlformats.org/markup-compatibility/2006" xmlns:a14="http://schemas.microsoft.com/office/drawing/2010/main">
+          <mc:Choice Requires="a14">
             <p:sp>
               <p:nvSpPr>
                 <p:cNvPr id="61" name="Flowchart: Process 60">
@@ -27496,7 +29365,7 @@
               </p:txBody>
             </p:sp>
           </mc:Choice>
-          <mc:Fallback>
+          <mc:Fallback xmlns="">
             <p:sp>
               <p:nvSpPr>
                 <p:cNvPr id="61" name="Flowchart: Process 60">
@@ -28351,8 +30220,8 @@
             </a:p>
           </p:txBody>
         </p:sp>
-        <mc:AlternateContent xmlns:mc="http://schemas.openxmlformats.org/markup-compatibility/2006">
-          <mc:Choice xmlns:a14="http://schemas.microsoft.com/office/drawing/2010/main" Requires="a14">
+        <mc:AlternateContent xmlns:mc="http://schemas.openxmlformats.org/markup-compatibility/2006" xmlns:a14="http://schemas.microsoft.com/office/drawing/2010/main">
+          <mc:Choice Requires="a14">
             <p:sp>
               <p:nvSpPr>
                 <p:cNvPr id="65" name="Flowchart: Process 64">
@@ -28549,7 +30418,7 @@
               </p:txBody>
             </p:sp>
           </mc:Choice>
-          <mc:Fallback>
+          <mc:Fallback xmlns="">
             <p:sp>
               <p:nvSpPr>
                 <p:cNvPr id="65" name="Flowchart: Process 64">
@@ -28779,8 +30648,8 @@
             </a:fontRef>
           </p:style>
         </p:cxnSp>
-        <mc:AlternateContent xmlns:mc="http://schemas.openxmlformats.org/markup-compatibility/2006">
-          <mc:Choice xmlns:a14="http://schemas.microsoft.com/office/drawing/2010/main" Requires="a14">
+        <mc:AlternateContent xmlns:mc="http://schemas.openxmlformats.org/markup-compatibility/2006" xmlns:a14="http://schemas.microsoft.com/office/drawing/2010/main">
+          <mc:Choice Requires="a14">
             <p:sp>
               <p:nvSpPr>
                 <p:cNvPr id="105" name="Flowchart: Process 104">
@@ -28911,7 +30780,7 @@
               </p:txBody>
             </p:sp>
           </mc:Choice>
-          <mc:Fallback>
+          <mc:Fallback xmlns="">
             <p:sp>
               <p:nvSpPr>
                 <p:cNvPr id="105" name="Flowchart: Process 104">
@@ -28957,8 +30826,8 @@
             </p:sp>
           </mc:Fallback>
         </mc:AlternateContent>
-        <mc:AlternateContent xmlns:mc="http://schemas.openxmlformats.org/markup-compatibility/2006">
-          <mc:Choice xmlns:a14="http://schemas.microsoft.com/office/drawing/2010/main" Requires="a14">
+        <mc:AlternateContent xmlns:mc="http://schemas.openxmlformats.org/markup-compatibility/2006" xmlns:a14="http://schemas.microsoft.com/office/drawing/2010/main">
+          <mc:Choice Requires="a14">
             <p:sp>
               <p:nvSpPr>
                 <p:cNvPr id="106" name="Flowchart: Process 105">
@@ -29043,7 +30912,7 @@
                         <m:f>
                           <m:fPr>
                             <m:ctrlPr>
-                              <a:rPr lang="en-AU" sz="1400" b="0" i="0" smtClean="0">
+                              <a:rPr lang="en-AU" sz="1400" b="0" i="1" smtClean="0">
                                 <a:solidFill>
                                   <a:schemeClr val="accent2"/>
                                 </a:solidFill>
@@ -29122,7 +30991,7 @@
               </p:txBody>
             </p:sp>
           </mc:Choice>
-          <mc:Fallback>
+          <mc:Fallback xmlns="">
             <p:sp>
               <p:nvSpPr>
                 <p:cNvPr id="106" name="Flowchart: Process 105">
@@ -29533,8 +31402,8 @@
             <a:chExt cx="9155156" cy="2186924"/>
           </a:xfrm>
         </p:grpSpPr>
-        <mc:AlternateContent xmlns:mc="http://schemas.openxmlformats.org/markup-compatibility/2006">
-          <mc:Choice xmlns:a14="http://schemas.microsoft.com/office/drawing/2010/main" Requires="a14">
+        <mc:AlternateContent xmlns:mc="http://schemas.openxmlformats.org/markup-compatibility/2006" xmlns:a14="http://schemas.microsoft.com/office/drawing/2010/main">
+          <mc:Choice Requires="a14">
             <p:sp>
               <p:nvSpPr>
                 <p:cNvPr id="120" name="Flowchart: Process 119">
@@ -29631,7 +31500,7 @@
               </p:txBody>
             </p:sp>
           </mc:Choice>
-          <mc:Fallback>
+          <mc:Fallback xmlns="">
             <p:sp>
               <p:nvSpPr>
                 <p:cNvPr id="120" name="Flowchart: Process 119">
@@ -30446,8 +32315,8 @@
             </a:p>
           </p:txBody>
         </p:sp>
-        <mc:AlternateContent xmlns:mc="http://schemas.openxmlformats.org/markup-compatibility/2006">
-          <mc:Choice xmlns:a14="http://schemas.microsoft.com/office/drawing/2010/main" Requires="a14">
+        <mc:AlternateContent xmlns:mc="http://schemas.openxmlformats.org/markup-compatibility/2006" xmlns:a14="http://schemas.microsoft.com/office/drawing/2010/main">
+          <mc:Choice Requires="a14">
             <p:sp>
               <p:nvSpPr>
                 <p:cNvPr id="138" name="Flowchart: Process 137">
@@ -30578,7 +32447,7 @@
               </p:txBody>
             </p:sp>
           </mc:Choice>
-          <mc:Fallback>
+          <mc:Fallback xmlns="">
             <p:sp>
               <p:nvSpPr>
                 <p:cNvPr id="138" name="Flowchart: Process 137">
@@ -30808,8 +32677,8 @@
             </a:fontRef>
           </p:style>
         </p:cxnSp>
-        <mc:AlternateContent xmlns:mc="http://schemas.openxmlformats.org/markup-compatibility/2006">
-          <mc:Choice xmlns:a14="http://schemas.microsoft.com/office/drawing/2010/main" Requires="a14">
+        <mc:AlternateContent xmlns:mc="http://schemas.openxmlformats.org/markup-compatibility/2006" xmlns:a14="http://schemas.microsoft.com/office/drawing/2010/main">
+          <mc:Choice Requires="a14">
             <p:sp>
               <p:nvSpPr>
                 <p:cNvPr id="144" name="Flowchart: Process 143">
@@ -30910,16 +32779,7 @@
                                 </a:solidFill>
                                 <a:latin typeface="Cambria Math" panose="02040503050406030204" pitchFamily="18" charset="0"/>
                               </a:rPr>
-                              <m:t>𝑑</m:t>
-                            </m:r>
-                            <m:r>
-                              <a:rPr lang="en-AU" sz="1400" i="1">
-                                <a:solidFill>
-                                  <a:schemeClr val="accent2"/>
-                                </a:solidFill>
-                                <a:latin typeface="Cambria Math" panose="02040503050406030204" pitchFamily="18" charset="0"/>
-                              </a:rPr>
-                              <m:t>𝑒</m:t>
+                              <m:t>𝑑𝑒</m:t>
                             </m:r>
                             <m:d>
                               <m:dPr>
@@ -30973,7 +32833,7 @@
               </p:txBody>
             </p:sp>
           </mc:Choice>
-          <mc:Fallback>
+          <mc:Fallback xmlns="">
             <p:sp>
               <p:nvSpPr>
                 <p:cNvPr id="144" name="Flowchart: Process 143">
@@ -31252,8 +33112,8 @@
             <a:chExt cx="9155156" cy="1353868"/>
           </a:xfrm>
         </p:grpSpPr>
-        <mc:AlternateContent xmlns:mc="http://schemas.openxmlformats.org/markup-compatibility/2006">
-          <mc:Choice xmlns:a14="http://schemas.microsoft.com/office/drawing/2010/main" Requires="a14">
+        <mc:AlternateContent xmlns:mc="http://schemas.openxmlformats.org/markup-compatibility/2006" xmlns:a14="http://schemas.microsoft.com/office/drawing/2010/main">
+          <mc:Choice Requires="a14">
             <p:sp>
               <p:nvSpPr>
                 <p:cNvPr id="151" name="Flowchart: Process 150">
@@ -31350,7 +33210,7 @@
               </p:txBody>
             </p:sp>
           </mc:Choice>
-          <mc:Fallback>
+          <mc:Fallback xmlns="">
             <p:sp>
               <p:nvSpPr>
                 <p:cNvPr id="151" name="Flowchart: Process 150">
@@ -32029,8 +33889,8 @@
             </a:p>
           </p:txBody>
         </p:sp>
-        <mc:AlternateContent xmlns:mc="http://schemas.openxmlformats.org/markup-compatibility/2006">
-          <mc:Choice xmlns:a14="http://schemas.microsoft.com/office/drawing/2010/main" Requires="a14">
+        <mc:AlternateContent xmlns:mc="http://schemas.openxmlformats.org/markup-compatibility/2006" xmlns:a14="http://schemas.microsoft.com/office/drawing/2010/main">
+          <mc:Choice Requires="a14">
             <p:sp>
               <p:nvSpPr>
                 <p:cNvPr id="169" name="Flowchart: Process 168">
@@ -32161,7 +34021,7 @@
               </p:txBody>
             </p:sp>
           </mc:Choice>
-          <mc:Fallback>
+          <mc:Fallback xmlns="">
             <p:sp>
               <p:nvSpPr>
                 <p:cNvPr id="169" name="Flowchart: Process 168">
@@ -32360,8 +34220,8 @@
             <a:chExt cx="9155156" cy="2186924"/>
           </a:xfrm>
         </p:grpSpPr>
-        <mc:AlternateContent xmlns:mc="http://schemas.openxmlformats.org/markup-compatibility/2006">
-          <mc:Choice xmlns:a14="http://schemas.microsoft.com/office/drawing/2010/main" Requires="a14">
+        <mc:AlternateContent xmlns:mc="http://schemas.openxmlformats.org/markup-compatibility/2006" xmlns:a14="http://schemas.microsoft.com/office/drawing/2010/main">
+          <mc:Choice Requires="a14">
             <p:sp>
               <p:nvSpPr>
                 <p:cNvPr id="266" name="Flowchart: Process 265">
@@ -32458,7 +34318,7 @@
               </p:txBody>
             </p:sp>
           </mc:Choice>
-          <mc:Fallback>
+          <mc:Fallback xmlns="">
             <p:sp>
               <p:nvSpPr>
                 <p:cNvPr id="266" name="Flowchart: Process 265">
@@ -33273,8 +35133,8 @@
             </a:p>
           </p:txBody>
         </p:sp>
-        <mc:AlternateContent xmlns:mc="http://schemas.openxmlformats.org/markup-compatibility/2006">
-          <mc:Choice xmlns:a14="http://schemas.microsoft.com/office/drawing/2010/main" Requires="a14">
+        <mc:AlternateContent xmlns:mc="http://schemas.openxmlformats.org/markup-compatibility/2006" xmlns:a14="http://schemas.microsoft.com/office/drawing/2010/main">
+          <mc:Choice Requires="a14">
             <p:sp>
               <p:nvSpPr>
                 <p:cNvPr id="283" name="Flowchart: Process 282">
@@ -33405,7 +35265,7 @@
               </p:txBody>
             </p:sp>
           </mc:Choice>
-          <mc:Fallback>
+          <mc:Fallback xmlns="">
             <p:sp>
               <p:nvSpPr>
                 <p:cNvPr id="283" name="Flowchart: Process 282">
@@ -33635,8 +35495,8 @@
             </a:fontRef>
           </p:style>
         </p:cxnSp>
-        <mc:AlternateContent xmlns:mc="http://schemas.openxmlformats.org/markup-compatibility/2006">
-          <mc:Choice xmlns:a14="http://schemas.microsoft.com/office/drawing/2010/main" Requires="a14">
+        <mc:AlternateContent xmlns:mc="http://schemas.openxmlformats.org/markup-compatibility/2006" xmlns:a14="http://schemas.microsoft.com/office/drawing/2010/main">
+          <mc:Choice Requires="a14">
             <p:sp>
               <p:nvSpPr>
                 <p:cNvPr id="288" name="Flowchart: Process 287">
@@ -33833,7 +35693,7 @@
               </p:txBody>
             </p:sp>
           </mc:Choice>
-          <mc:Fallback>
+          <mc:Fallback xmlns="">
             <p:sp>
               <p:nvSpPr>
                 <p:cNvPr id="288" name="Flowchart: Process 287">
@@ -34105,7 +35965,7 @@
 </p:sld>
 </file>
 
-<file path=ppt/slides/slide4.xml><?xml version="1.0" encoding="utf-8"?>
+<file path=ppt/slides/slide5.xml><?xml version="1.0" encoding="utf-8"?>
 <p:sld xmlns:a="http://schemas.openxmlformats.org/drawingml/2006/main" xmlns:r="http://schemas.openxmlformats.org/officeDocument/2006/relationships" xmlns:p="http://schemas.openxmlformats.org/presentationml/2006/main">
   <p:cSld>
     <p:spTree>
@@ -35138,7 +36998,7 @@
 </p:sld>
 </file>
 
-<file path=ppt/slides/slide5.xml><?xml version="1.0" encoding="utf-8"?>
+<file path=ppt/slides/slide6.xml><?xml version="1.0" encoding="utf-8"?>
 <p:sld xmlns:a="http://schemas.openxmlformats.org/drawingml/2006/main" xmlns:r="http://schemas.openxmlformats.org/officeDocument/2006/relationships" xmlns:p="http://schemas.openxmlformats.org/presentationml/2006/main">
   <p:cSld>
     <p:spTree>
@@ -37620,7 +39480,7 @@
 </p:sld>
 </file>
 
-<file path=ppt/slides/slide6.xml><?xml version="1.0" encoding="utf-8"?>
+<file path=ppt/slides/slide7.xml><?xml version="1.0" encoding="utf-8"?>
 <p:sld xmlns:a="http://schemas.openxmlformats.org/drawingml/2006/main" xmlns:r="http://schemas.openxmlformats.org/officeDocument/2006/relationships" xmlns:p="http://schemas.openxmlformats.org/presentationml/2006/main">
   <p:cSld>
     <p:spTree>
@@ -39729,7 +41589,7 @@
 </p:sld>
 </file>
 
-<file path=ppt/slides/slide7.xml><?xml version="1.0" encoding="utf-8"?>
+<file path=ppt/slides/slide8.xml><?xml version="1.0" encoding="utf-8"?>
 <p:sld xmlns:a="http://schemas.openxmlformats.org/drawingml/2006/main" xmlns:r="http://schemas.openxmlformats.org/officeDocument/2006/relationships" xmlns:p="http://schemas.openxmlformats.org/presentationml/2006/main">
   <p:cSld>
     <p:spTree>
@@ -40703,7 +42563,7 @@
 </p:sld>
 </file>
 
-<file path=ppt/slides/slide8.xml><?xml version="1.0" encoding="utf-8"?>
+<file path=ppt/slides/slide9.xml><?xml version="1.0" encoding="utf-8"?>
 <p:sld xmlns:a="http://schemas.openxmlformats.org/drawingml/2006/main" xmlns:r="http://schemas.openxmlformats.org/officeDocument/2006/relationships" xmlns:p="http://schemas.openxmlformats.org/presentationml/2006/main">
   <p:cSld>
     <p:spTree>
@@ -40961,1180 +42821,6 @@
     <p:extLst>
       <p:ext uri="{BB962C8B-B14F-4D97-AF65-F5344CB8AC3E}">
         <p14:creationId xmlns:p14="http://schemas.microsoft.com/office/powerpoint/2010/main" val="3737468489"/>
-      </p:ext>
-    </p:extLst>
-  </p:cSld>
-  <p:clrMapOvr>
-    <a:masterClrMapping/>
-  </p:clrMapOvr>
-</p:sld>
-</file>
-
-<file path=ppt/slides/slide9.xml><?xml version="1.0" encoding="utf-8"?>
-<p:sld xmlns:a="http://schemas.openxmlformats.org/drawingml/2006/main" xmlns:r="http://schemas.openxmlformats.org/officeDocument/2006/relationships" xmlns:p="http://schemas.openxmlformats.org/presentationml/2006/main">
-  <p:cSld>
-    <p:spTree>
-      <p:nvGrpSpPr>
-        <p:cNvPr id="1" name=""/>
-        <p:cNvGrpSpPr/>
-        <p:nvPr/>
-      </p:nvGrpSpPr>
-      <p:grpSpPr>
-        <a:xfrm>
-          <a:off x="0" y="0"/>
-          <a:ext cx="0" cy="0"/>
-          <a:chOff x="0" y="0"/>
-          <a:chExt cx="0" cy="0"/>
-        </a:xfrm>
-      </p:grpSpPr>
-      <p:grpSp>
-        <p:nvGrpSpPr>
-          <p:cNvPr id="56" name="Group 55">
-            <a:extLst>
-              <a:ext uri="{FF2B5EF4-FFF2-40B4-BE49-F238E27FC236}">
-                <a16:creationId xmlns:a16="http://schemas.microsoft.com/office/drawing/2014/main" id="{6EDCED04-815B-4D76-AEA5-6F8C60647ACA}"/>
-              </a:ext>
-            </a:extLst>
-          </p:cNvPr>
-          <p:cNvGrpSpPr/>
-          <p:nvPr/>
-        </p:nvGrpSpPr>
-        <p:grpSpPr>
-          <a:xfrm>
-            <a:off x="1361095" y="2943550"/>
-            <a:ext cx="3344550" cy="2635379"/>
-            <a:chOff x="1361095" y="2943550"/>
-            <a:chExt cx="3344550" cy="2635379"/>
-          </a:xfrm>
-        </p:grpSpPr>
-        <p:sp>
-          <p:nvSpPr>
-            <p:cNvPr id="4" name="Oval 3">
-              <a:extLst>
-                <a:ext uri="{FF2B5EF4-FFF2-40B4-BE49-F238E27FC236}">
-                  <a16:creationId xmlns:a16="http://schemas.microsoft.com/office/drawing/2014/main" id="{130EC464-2131-49FA-AA07-EFFA47C79029}"/>
-                </a:ext>
-              </a:extLst>
-            </p:cNvPr>
-            <p:cNvSpPr/>
-            <p:nvPr/>
-          </p:nvSpPr>
-          <p:spPr>
-            <a:xfrm>
-              <a:off x="2675570" y="3884776"/>
-              <a:ext cx="1172048" cy="1172048"/>
-            </a:xfrm>
-            <a:prstGeom prst="ellipse">
-              <a:avLst/>
-            </a:prstGeom>
-          </p:spPr>
-          <p:style>
-            <a:lnRef idx="2">
-              <a:schemeClr val="accent1">
-                <a:shade val="50000"/>
-              </a:schemeClr>
-            </a:lnRef>
-            <a:fillRef idx="1">
-              <a:schemeClr val="accent1"/>
-            </a:fillRef>
-            <a:effectRef idx="0">
-              <a:schemeClr val="accent1"/>
-            </a:effectRef>
-            <a:fontRef idx="minor">
-              <a:schemeClr val="lt1"/>
-            </a:fontRef>
-          </p:style>
-          <p:txBody>
-            <a:bodyPr rtlCol="0" anchor="ctr"/>
-            <a:lstStyle/>
-            <a:p>
-              <a:pPr algn="ctr"/>
-              <a:r>
-                <a:rPr lang="en-AU" dirty="0">
-                  <a:latin typeface="Consolas" panose="020B0609020204030204" pitchFamily="49" charset="0"/>
-                </a:rPr>
-                <a:t>A</a:t>
-              </a:r>
-            </a:p>
-          </p:txBody>
-        </p:sp>
-        <p:grpSp>
-          <p:nvGrpSpPr>
-            <p:cNvPr id="13" name="Group 12">
-              <a:extLst>
-                <a:ext uri="{FF2B5EF4-FFF2-40B4-BE49-F238E27FC236}">
-                  <a16:creationId xmlns:a16="http://schemas.microsoft.com/office/drawing/2014/main" id="{5C08818E-1B1F-45C1-AA21-CC545D8F4323}"/>
-                </a:ext>
-              </a:extLst>
-            </p:cNvPr>
-            <p:cNvGrpSpPr/>
-            <p:nvPr/>
-          </p:nvGrpSpPr>
-          <p:grpSpPr>
-            <a:xfrm>
-              <a:off x="1825645" y="3420159"/>
-              <a:ext cx="2880000" cy="1768177"/>
-              <a:chOff x="1825645" y="3420159"/>
-              <a:chExt cx="2880000" cy="1768177"/>
-            </a:xfrm>
-          </p:grpSpPr>
-          <p:sp>
-            <p:nvSpPr>
-              <p:cNvPr id="11" name="Rectangle 10">
-                <a:extLst>
-                  <a:ext uri="{FF2B5EF4-FFF2-40B4-BE49-F238E27FC236}">
-                    <a16:creationId xmlns:a16="http://schemas.microsoft.com/office/drawing/2014/main" id="{349B4208-A35A-4398-B54A-C833226FA1B1}"/>
-                  </a:ext>
-                </a:extLst>
-              </p:cNvPr>
-              <p:cNvSpPr/>
-              <p:nvPr/>
-            </p:nvSpPr>
-            <p:spPr>
-              <a:xfrm>
-                <a:off x="1825645" y="3607081"/>
-                <a:ext cx="186922" cy="1581255"/>
-              </a:xfrm>
-              <a:prstGeom prst="rect">
-                <a:avLst/>
-              </a:prstGeom>
-              <a:ln>
-                <a:noFill/>
-              </a:ln>
-            </p:spPr>
-            <p:style>
-              <a:lnRef idx="2">
-                <a:schemeClr val="dk1">
-                  <a:shade val="50000"/>
-                </a:schemeClr>
-              </a:lnRef>
-              <a:fillRef idx="1">
-                <a:schemeClr val="dk1"/>
-              </a:fillRef>
-              <a:effectRef idx="0">
-                <a:schemeClr val="dk1"/>
-              </a:effectRef>
-              <a:fontRef idx="minor">
-                <a:schemeClr val="lt1"/>
-              </a:fontRef>
-            </p:style>
-            <p:txBody>
-              <a:bodyPr rtlCol="0" anchor="ctr"/>
-              <a:lstStyle/>
-              <a:p>
-                <a:pPr algn="ctr"/>
-                <a:endParaRPr lang="en-AU" dirty="0">
-                  <a:latin typeface="Consolas" panose="020B0609020204030204" pitchFamily="49" charset="0"/>
-                </a:endParaRPr>
-              </a:p>
-            </p:txBody>
-          </p:sp>
-          <p:sp>
-            <p:nvSpPr>
-              <p:cNvPr id="27" name="Rectangle 26">
-                <a:extLst>
-                  <a:ext uri="{FF2B5EF4-FFF2-40B4-BE49-F238E27FC236}">
-                    <a16:creationId xmlns:a16="http://schemas.microsoft.com/office/drawing/2014/main" id="{BDCE1AD9-FD69-4A3F-87C5-99D1EB029A44}"/>
-                  </a:ext>
-                </a:extLst>
-              </p:cNvPr>
-              <p:cNvSpPr/>
-              <p:nvPr/>
-            </p:nvSpPr>
-            <p:spPr>
-              <a:xfrm rot="5400000">
-                <a:off x="3172184" y="2073620"/>
-                <a:ext cx="186922" cy="2880000"/>
-              </a:xfrm>
-              <a:prstGeom prst="rect">
-                <a:avLst/>
-              </a:prstGeom>
-              <a:ln>
-                <a:noFill/>
-              </a:ln>
-            </p:spPr>
-            <p:style>
-              <a:lnRef idx="2">
-                <a:schemeClr val="dk1">
-                  <a:shade val="50000"/>
-                </a:schemeClr>
-              </a:lnRef>
-              <a:fillRef idx="1">
-                <a:schemeClr val="dk1"/>
-              </a:fillRef>
-              <a:effectRef idx="0">
-                <a:schemeClr val="dk1"/>
-              </a:effectRef>
-              <a:fontRef idx="minor">
-                <a:schemeClr val="lt1"/>
-              </a:fontRef>
-            </p:style>
-            <p:txBody>
-              <a:bodyPr rtlCol="0" anchor="ctr"/>
-              <a:lstStyle/>
-              <a:p>
-                <a:pPr algn="ctr"/>
-                <a:endParaRPr lang="en-AU" dirty="0">
-                  <a:latin typeface="Consolas" panose="020B0609020204030204" pitchFamily="49" charset="0"/>
-                </a:endParaRPr>
-              </a:p>
-            </p:txBody>
-          </p:sp>
-          <p:sp>
-            <p:nvSpPr>
-              <p:cNvPr id="28" name="Rectangle 27">
-                <a:extLst>
-                  <a:ext uri="{FF2B5EF4-FFF2-40B4-BE49-F238E27FC236}">
-                    <a16:creationId xmlns:a16="http://schemas.microsoft.com/office/drawing/2014/main" id="{501D23E6-DB19-4514-A211-5E921C1BF9E4}"/>
-                  </a:ext>
-                </a:extLst>
-              </p:cNvPr>
-              <p:cNvSpPr/>
-              <p:nvPr/>
-            </p:nvSpPr>
-            <p:spPr>
-              <a:xfrm>
-                <a:off x="4518094" y="3607081"/>
-                <a:ext cx="186922" cy="1581255"/>
-              </a:xfrm>
-              <a:prstGeom prst="rect">
-                <a:avLst/>
-              </a:prstGeom>
-              <a:ln>
-                <a:noFill/>
-              </a:ln>
-            </p:spPr>
-            <p:style>
-              <a:lnRef idx="2">
-                <a:schemeClr val="dk1">
-                  <a:shade val="50000"/>
-                </a:schemeClr>
-              </a:lnRef>
-              <a:fillRef idx="1">
-                <a:schemeClr val="dk1"/>
-              </a:fillRef>
-              <a:effectRef idx="0">
-                <a:schemeClr val="dk1"/>
-              </a:effectRef>
-              <a:fontRef idx="minor">
-                <a:schemeClr val="lt1"/>
-              </a:fontRef>
-            </p:style>
-            <p:txBody>
-              <a:bodyPr rtlCol="0" anchor="ctr"/>
-              <a:lstStyle/>
-              <a:p>
-                <a:pPr algn="ctr"/>
-                <a:endParaRPr lang="en-AU" dirty="0">
-                  <a:latin typeface="Consolas" panose="020B0609020204030204" pitchFamily="49" charset="0"/>
-                </a:endParaRPr>
-              </a:p>
-            </p:txBody>
-          </p:sp>
-        </p:grpSp>
-        <p:grpSp>
-          <p:nvGrpSpPr>
-            <p:cNvPr id="26" name="Group 25">
-              <a:extLst>
-                <a:ext uri="{FF2B5EF4-FFF2-40B4-BE49-F238E27FC236}">
-                  <a16:creationId xmlns:a16="http://schemas.microsoft.com/office/drawing/2014/main" id="{5152645B-23D6-433B-AF92-3D4AAE5B7C6C}"/>
-                </a:ext>
-              </a:extLst>
-            </p:cNvPr>
-            <p:cNvGrpSpPr/>
-            <p:nvPr/>
-          </p:nvGrpSpPr>
-          <p:grpSpPr>
-            <a:xfrm>
-              <a:off x="1825645" y="3818892"/>
-              <a:ext cx="739877" cy="1369444"/>
-              <a:chOff x="1919106" y="3768744"/>
-              <a:chExt cx="653700" cy="1209938"/>
-            </a:xfrm>
-            <a:solidFill>
-              <a:srgbClr val="FF5B5B"/>
-            </a:solidFill>
-          </p:grpSpPr>
-          <p:grpSp>
-            <p:nvGrpSpPr>
-              <p:cNvPr id="12" name="Group 11">
-                <a:extLst>
-                  <a:ext uri="{FF2B5EF4-FFF2-40B4-BE49-F238E27FC236}">
-                    <a16:creationId xmlns:a16="http://schemas.microsoft.com/office/drawing/2014/main" id="{ED0C8046-293F-4374-BFA4-67ECF006A06A}"/>
-                  </a:ext>
-                </a:extLst>
-              </p:cNvPr>
-              <p:cNvGrpSpPr/>
-              <p:nvPr/>
-            </p:nvGrpSpPr>
-            <p:grpSpPr>
-              <a:xfrm>
-                <a:off x="1919106" y="3768744"/>
-                <a:ext cx="653700" cy="419310"/>
-                <a:chOff x="1346870" y="759679"/>
-                <a:chExt cx="653700" cy="419310"/>
-              </a:xfrm>
-              <a:grpFill/>
-            </p:grpSpPr>
-            <p:sp>
-              <p:nvSpPr>
-                <p:cNvPr id="18" name="Rectangle 17">
-                  <a:extLst>
-                    <a:ext uri="{FF2B5EF4-FFF2-40B4-BE49-F238E27FC236}">
-                      <a16:creationId xmlns:a16="http://schemas.microsoft.com/office/drawing/2014/main" id="{30C67930-4A5E-48AD-A72D-2F6E7DB509A1}"/>
-                    </a:ext>
-                  </a:extLst>
-                </p:cNvPr>
-                <p:cNvSpPr/>
-                <p:nvPr/>
-              </p:nvSpPr>
-              <p:spPr>
-                <a:xfrm>
-                  <a:off x="1346870" y="875874"/>
-                  <a:ext cx="186921" cy="186921"/>
-                </a:xfrm>
-                <a:prstGeom prst="rect">
-                  <a:avLst/>
-                </a:prstGeom>
-                <a:ln/>
-              </p:spPr>
-              <p:style>
-                <a:lnRef idx="2">
-                  <a:schemeClr val="accent4">
-                    <a:shade val="50000"/>
-                  </a:schemeClr>
-                </a:lnRef>
-                <a:fillRef idx="1">
-                  <a:schemeClr val="accent4"/>
-                </a:fillRef>
-                <a:effectRef idx="0">
-                  <a:schemeClr val="accent4"/>
-                </a:effectRef>
-                <a:fontRef idx="minor">
-                  <a:schemeClr val="lt1"/>
-                </a:fontRef>
-              </p:style>
-              <p:txBody>
-                <a:bodyPr rtlCol="0" anchor="ctr"/>
-                <a:lstStyle/>
-                <a:p>
-                  <a:pPr algn="ctr"/>
-                  <a:endParaRPr lang="en-AU" dirty="0">
-                    <a:latin typeface="Consolas" panose="020B0609020204030204" pitchFamily="49" charset="0"/>
-                  </a:endParaRPr>
-                </a:p>
-              </p:txBody>
-            </p:sp>
-            <p:sp>
-              <p:nvSpPr>
-                <p:cNvPr id="20" name="Isosceles Triangle 19">
-                  <a:extLst>
-                    <a:ext uri="{FF2B5EF4-FFF2-40B4-BE49-F238E27FC236}">
-                      <a16:creationId xmlns:a16="http://schemas.microsoft.com/office/drawing/2014/main" id="{72CA8F22-CAFC-4524-A447-42B68AE65B46}"/>
-                    </a:ext>
-                  </a:extLst>
-                </p:cNvPr>
-                <p:cNvSpPr/>
-                <p:nvPr/>
-              </p:nvSpPr>
-              <p:spPr>
-                <a:xfrm rot="16200000">
-                  <a:off x="1584365" y="762784"/>
-                  <a:ext cx="419310" cy="413100"/>
-                </a:xfrm>
-                <a:prstGeom prst="triangle">
-                  <a:avLst/>
-                </a:prstGeom>
-                <a:ln/>
-              </p:spPr>
-              <p:style>
-                <a:lnRef idx="2">
-                  <a:schemeClr val="accent4">
-                    <a:shade val="50000"/>
-                  </a:schemeClr>
-                </a:lnRef>
-                <a:fillRef idx="1">
-                  <a:schemeClr val="accent4"/>
-                </a:fillRef>
-                <a:effectRef idx="0">
-                  <a:schemeClr val="accent4"/>
-                </a:effectRef>
-                <a:fontRef idx="minor">
-                  <a:schemeClr val="lt1"/>
-                </a:fontRef>
-              </p:style>
-              <p:txBody>
-                <a:bodyPr rtlCol="0" anchor="ctr"/>
-                <a:lstStyle/>
-                <a:p>
-                  <a:pPr algn="ctr"/>
-                  <a:endParaRPr lang="en-AU" dirty="0">
-                    <a:latin typeface="Consolas" panose="020B0609020204030204" pitchFamily="49" charset="0"/>
-                  </a:endParaRPr>
-                </a:p>
-              </p:txBody>
-            </p:sp>
-          </p:grpSp>
-          <p:grpSp>
-            <p:nvGrpSpPr>
-              <p:cNvPr id="30" name="Group 29">
-                <a:extLst>
-                  <a:ext uri="{FF2B5EF4-FFF2-40B4-BE49-F238E27FC236}">
-                    <a16:creationId xmlns:a16="http://schemas.microsoft.com/office/drawing/2014/main" id="{1A43385A-0D68-4128-ACB9-24C75736BCBA}"/>
-                  </a:ext>
-                </a:extLst>
-              </p:cNvPr>
-              <p:cNvGrpSpPr/>
-              <p:nvPr/>
-            </p:nvGrpSpPr>
-            <p:grpSpPr>
-              <a:xfrm>
-                <a:off x="1919106" y="4559372"/>
-                <a:ext cx="653700" cy="419310"/>
-                <a:chOff x="1346870" y="759679"/>
-                <a:chExt cx="653700" cy="419310"/>
-              </a:xfrm>
-              <a:grpFill/>
-            </p:grpSpPr>
-            <p:sp>
-              <p:nvSpPr>
-                <p:cNvPr id="31" name="Rectangle 30">
-                  <a:extLst>
-                    <a:ext uri="{FF2B5EF4-FFF2-40B4-BE49-F238E27FC236}">
-                      <a16:creationId xmlns:a16="http://schemas.microsoft.com/office/drawing/2014/main" id="{592B12ED-3C60-4B33-86BE-DF1ABB4F9842}"/>
-                    </a:ext>
-                  </a:extLst>
-                </p:cNvPr>
-                <p:cNvSpPr/>
-                <p:nvPr/>
-              </p:nvSpPr>
-              <p:spPr>
-                <a:xfrm>
-                  <a:off x="1346870" y="875874"/>
-                  <a:ext cx="186921" cy="186921"/>
-                </a:xfrm>
-                <a:prstGeom prst="rect">
-                  <a:avLst/>
-                </a:prstGeom>
-                <a:ln/>
-              </p:spPr>
-              <p:style>
-                <a:lnRef idx="2">
-                  <a:schemeClr val="accent4">
-                    <a:shade val="50000"/>
-                  </a:schemeClr>
-                </a:lnRef>
-                <a:fillRef idx="1">
-                  <a:schemeClr val="accent4"/>
-                </a:fillRef>
-                <a:effectRef idx="0">
-                  <a:schemeClr val="accent4"/>
-                </a:effectRef>
-                <a:fontRef idx="minor">
-                  <a:schemeClr val="lt1"/>
-                </a:fontRef>
-              </p:style>
-              <p:txBody>
-                <a:bodyPr rtlCol="0" anchor="ctr"/>
-                <a:lstStyle/>
-                <a:p>
-                  <a:pPr algn="ctr"/>
-                  <a:endParaRPr lang="en-AU" dirty="0">
-                    <a:latin typeface="Consolas" panose="020B0609020204030204" pitchFamily="49" charset="0"/>
-                  </a:endParaRPr>
-                </a:p>
-              </p:txBody>
-            </p:sp>
-            <p:sp>
-              <p:nvSpPr>
-                <p:cNvPr id="34" name="Isosceles Triangle 33">
-                  <a:extLst>
-                    <a:ext uri="{FF2B5EF4-FFF2-40B4-BE49-F238E27FC236}">
-                      <a16:creationId xmlns:a16="http://schemas.microsoft.com/office/drawing/2014/main" id="{98C36064-C1DB-4FE5-A1E1-B727E5065E48}"/>
-                    </a:ext>
-                  </a:extLst>
-                </p:cNvPr>
-                <p:cNvSpPr/>
-                <p:nvPr/>
-              </p:nvSpPr>
-              <p:spPr>
-                <a:xfrm rot="16200000">
-                  <a:off x="1584365" y="762784"/>
-                  <a:ext cx="419310" cy="413100"/>
-                </a:xfrm>
-                <a:prstGeom prst="triangle">
-                  <a:avLst/>
-                </a:prstGeom>
-                <a:ln/>
-              </p:spPr>
-              <p:style>
-                <a:lnRef idx="2">
-                  <a:schemeClr val="accent4">
-                    <a:shade val="50000"/>
-                  </a:schemeClr>
-                </a:lnRef>
-                <a:fillRef idx="1">
-                  <a:schemeClr val="accent4"/>
-                </a:fillRef>
-                <a:effectRef idx="0">
-                  <a:schemeClr val="accent4"/>
-                </a:effectRef>
-                <a:fontRef idx="minor">
-                  <a:schemeClr val="lt1"/>
-                </a:fontRef>
-              </p:style>
-              <p:txBody>
-                <a:bodyPr rtlCol="0" anchor="ctr"/>
-                <a:lstStyle/>
-                <a:p>
-                  <a:pPr algn="ctr"/>
-                  <a:endParaRPr lang="en-AU" dirty="0">
-                    <a:latin typeface="Consolas" panose="020B0609020204030204" pitchFamily="49" charset="0"/>
-                  </a:endParaRPr>
-                </a:p>
-              </p:txBody>
-            </p:sp>
-          </p:grpSp>
-        </p:grpSp>
-        <p:grpSp>
-          <p:nvGrpSpPr>
-            <p:cNvPr id="35" name="Group 34">
-              <a:extLst>
-                <a:ext uri="{FF2B5EF4-FFF2-40B4-BE49-F238E27FC236}">
-                  <a16:creationId xmlns:a16="http://schemas.microsoft.com/office/drawing/2014/main" id="{09C03945-6A2D-4B22-B97D-767182BF8F08}"/>
-                </a:ext>
-              </a:extLst>
-            </p:cNvPr>
-            <p:cNvGrpSpPr/>
-            <p:nvPr/>
-          </p:nvGrpSpPr>
-          <p:grpSpPr>
-            <a:xfrm rot="10800000">
-              <a:off x="3965768" y="3818892"/>
-              <a:ext cx="739877" cy="1369444"/>
-              <a:chOff x="1919106" y="3768744"/>
-              <a:chExt cx="653700" cy="1209938"/>
-            </a:xfrm>
-            <a:solidFill>
-              <a:srgbClr val="FF5B5B"/>
-            </a:solidFill>
-          </p:grpSpPr>
-          <p:grpSp>
-            <p:nvGrpSpPr>
-              <p:cNvPr id="36" name="Group 35">
-                <a:extLst>
-                  <a:ext uri="{FF2B5EF4-FFF2-40B4-BE49-F238E27FC236}">
-                    <a16:creationId xmlns:a16="http://schemas.microsoft.com/office/drawing/2014/main" id="{9E5A4C94-B532-464A-8FFD-E9B9687CBB3B}"/>
-                  </a:ext>
-                </a:extLst>
-              </p:cNvPr>
-              <p:cNvGrpSpPr/>
-              <p:nvPr/>
-            </p:nvGrpSpPr>
-            <p:grpSpPr>
-              <a:xfrm>
-                <a:off x="1919106" y="3768744"/>
-                <a:ext cx="653700" cy="419310"/>
-                <a:chOff x="1346870" y="759679"/>
-                <a:chExt cx="653700" cy="419310"/>
-              </a:xfrm>
-              <a:grpFill/>
-            </p:grpSpPr>
-            <p:sp>
-              <p:nvSpPr>
-                <p:cNvPr id="40" name="Rectangle 39">
-                  <a:extLst>
-                    <a:ext uri="{FF2B5EF4-FFF2-40B4-BE49-F238E27FC236}">
-                      <a16:creationId xmlns:a16="http://schemas.microsoft.com/office/drawing/2014/main" id="{939CF1DC-D50C-49A3-8D73-8283422BCB1C}"/>
-                    </a:ext>
-                  </a:extLst>
-                </p:cNvPr>
-                <p:cNvSpPr/>
-                <p:nvPr/>
-              </p:nvSpPr>
-              <p:spPr>
-                <a:xfrm>
-                  <a:off x="1346870" y="875874"/>
-                  <a:ext cx="186921" cy="186921"/>
-                </a:xfrm>
-                <a:prstGeom prst="rect">
-                  <a:avLst/>
-                </a:prstGeom>
-                <a:ln/>
-              </p:spPr>
-              <p:style>
-                <a:lnRef idx="2">
-                  <a:schemeClr val="accent4">
-                    <a:shade val="50000"/>
-                  </a:schemeClr>
-                </a:lnRef>
-                <a:fillRef idx="1">
-                  <a:schemeClr val="accent4"/>
-                </a:fillRef>
-                <a:effectRef idx="0">
-                  <a:schemeClr val="accent4"/>
-                </a:effectRef>
-                <a:fontRef idx="minor">
-                  <a:schemeClr val="lt1"/>
-                </a:fontRef>
-              </p:style>
-              <p:txBody>
-                <a:bodyPr rtlCol="0" anchor="ctr"/>
-                <a:lstStyle/>
-                <a:p>
-                  <a:pPr algn="ctr"/>
-                  <a:endParaRPr lang="en-AU" dirty="0">
-                    <a:latin typeface="Consolas" panose="020B0609020204030204" pitchFamily="49" charset="0"/>
-                  </a:endParaRPr>
-                </a:p>
-              </p:txBody>
-            </p:sp>
-            <p:sp>
-              <p:nvSpPr>
-                <p:cNvPr id="41" name="Isosceles Triangle 40">
-                  <a:extLst>
-                    <a:ext uri="{FF2B5EF4-FFF2-40B4-BE49-F238E27FC236}">
-                      <a16:creationId xmlns:a16="http://schemas.microsoft.com/office/drawing/2014/main" id="{815C94A4-1C66-4B12-9739-C4D2013C9A95}"/>
-                    </a:ext>
-                  </a:extLst>
-                </p:cNvPr>
-                <p:cNvSpPr/>
-                <p:nvPr/>
-              </p:nvSpPr>
-              <p:spPr>
-                <a:xfrm rot="16200000">
-                  <a:off x="1584365" y="762784"/>
-                  <a:ext cx="419310" cy="413100"/>
-                </a:xfrm>
-                <a:prstGeom prst="triangle">
-                  <a:avLst/>
-                </a:prstGeom>
-                <a:ln/>
-              </p:spPr>
-              <p:style>
-                <a:lnRef idx="2">
-                  <a:schemeClr val="accent4">
-                    <a:shade val="50000"/>
-                  </a:schemeClr>
-                </a:lnRef>
-                <a:fillRef idx="1">
-                  <a:schemeClr val="accent4"/>
-                </a:fillRef>
-                <a:effectRef idx="0">
-                  <a:schemeClr val="accent4"/>
-                </a:effectRef>
-                <a:fontRef idx="minor">
-                  <a:schemeClr val="lt1"/>
-                </a:fontRef>
-              </p:style>
-              <p:txBody>
-                <a:bodyPr rtlCol="0" anchor="ctr"/>
-                <a:lstStyle/>
-                <a:p>
-                  <a:pPr algn="ctr"/>
-                  <a:endParaRPr lang="en-AU" dirty="0">
-                    <a:latin typeface="Consolas" panose="020B0609020204030204" pitchFamily="49" charset="0"/>
-                  </a:endParaRPr>
-                </a:p>
-              </p:txBody>
-            </p:sp>
-          </p:grpSp>
-          <p:grpSp>
-            <p:nvGrpSpPr>
-              <p:cNvPr id="37" name="Group 36">
-                <a:extLst>
-                  <a:ext uri="{FF2B5EF4-FFF2-40B4-BE49-F238E27FC236}">
-                    <a16:creationId xmlns:a16="http://schemas.microsoft.com/office/drawing/2014/main" id="{A9D589EF-24E1-49C0-9603-345D6FC9F734}"/>
-                  </a:ext>
-                </a:extLst>
-              </p:cNvPr>
-              <p:cNvGrpSpPr/>
-              <p:nvPr/>
-            </p:nvGrpSpPr>
-            <p:grpSpPr>
-              <a:xfrm>
-                <a:off x="1919106" y="4559372"/>
-                <a:ext cx="653700" cy="419310"/>
-                <a:chOff x="1346870" y="759679"/>
-                <a:chExt cx="653700" cy="419310"/>
-              </a:xfrm>
-              <a:grpFill/>
-            </p:grpSpPr>
-            <p:sp>
-              <p:nvSpPr>
-                <p:cNvPr id="38" name="Rectangle 37">
-                  <a:extLst>
-                    <a:ext uri="{FF2B5EF4-FFF2-40B4-BE49-F238E27FC236}">
-                      <a16:creationId xmlns:a16="http://schemas.microsoft.com/office/drawing/2014/main" id="{826F25DA-C9AB-4E3E-9EBB-027D6D26FD0A}"/>
-                    </a:ext>
-                  </a:extLst>
-                </p:cNvPr>
-                <p:cNvSpPr/>
-                <p:nvPr/>
-              </p:nvSpPr>
-              <p:spPr>
-                <a:xfrm>
-                  <a:off x="1346870" y="875874"/>
-                  <a:ext cx="186921" cy="186921"/>
-                </a:xfrm>
-                <a:prstGeom prst="rect">
-                  <a:avLst/>
-                </a:prstGeom>
-                <a:ln/>
-              </p:spPr>
-              <p:style>
-                <a:lnRef idx="2">
-                  <a:schemeClr val="accent4">
-                    <a:shade val="50000"/>
-                  </a:schemeClr>
-                </a:lnRef>
-                <a:fillRef idx="1">
-                  <a:schemeClr val="accent4"/>
-                </a:fillRef>
-                <a:effectRef idx="0">
-                  <a:schemeClr val="accent4"/>
-                </a:effectRef>
-                <a:fontRef idx="minor">
-                  <a:schemeClr val="lt1"/>
-                </a:fontRef>
-              </p:style>
-              <p:txBody>
-                <a:bodyPr rtlCol="0" anchor="ctr"/>
-                <a:lstStyle/>
-                <a:p>
-                  <a:pPr algn="ctr"/>
-                  <a:endParaRPr lang="en-AU" dirty="0">
-                    <a:latin typeface="Consolas" panose="020B0609020204030204" pitchFamily="49" charset="0"/>
-                  </a:endParaRPr>
-                </a:p>
-              </p:txBody>
-            </p:sp>
-            <p:sp>
-              <p:nvSpPr>
-                <p:cNvPr id="39" name="Isosceles Triangle 38">
-                  <a:extLst>
-                    <a:ext uri="{FF2B5EF4-FFF2-40B4-BE49-F238E27FC236}">
-                      <a16:creationId xmlns:a16="http://schemas.microsoft.com/office/drawing/2014/main" id="{C1AE108F-BDF9-47B4-8D7B-26CA6AF044C5}"/>
-                    </a:ext>
-                  </a:extLst>
-                </p:cNvPr>
-                <p:cNvSpPr/>
-                <p:nvPr/>
-              </p:nvSpPr>
-              <p:spPr>
-                <a:xfrm rot="16200000">
-                  <a:off x="1584365" y="762784"/>
-                  <a:ext cx="419310" cy="413100"/>
-                </a:xfrm>
-                <a:prstGeom prst="triangle">
-                  <a:avLst/>
-                </a:prstGeom>
-                <a:ln/>
-              </p:spPr>
-              <p:style>
-                <a:lnRef idx="2">
-                  <a:schemeClr val="accent4">
-                    <a:shade val="50000"/>
-                  </a:schemeClr>
-                </a:lnRef>
-                <a:fillRef idx="1">
-                  <a:schemeClr val="accent4"/>
-                </a:fillRef>
-                <a:effectRef idx="0">
-                  <a:schemeClr val="accent4"/>
-                </a:effectRef>
-                <a:fontRef idx="minor">
-                  <a:schemeClr val="lt1"/>
-                </a:fontRef>
-              </p:style>
-              <p:txBody>
-                <a:bodyPr rtlCol="0" anchor="ctr"/>
-                <a:lstStyle/>
-                <a:p>
-                  <a:pPr algn="ctr"/>
-                  <a:endParaRPr lang="en-AU" dirty="0">
-                    <a:latin typeface="Consolas" panose="020B0609020204030204" pitchFamily="49" charset="0"/>
-                  </a:endParaRPr>
-                </a:p>
-              </p:txBody>
-            </p:sp>
-          </p:grpSp>
-        </p:grpSp>
-        <p:sp>
-          <p:nvSpPr>
-            <p:cNvPr id="29" name="TextBox 28">
-              <a:extLst>
-                <a:ext uri="{FF2B5EF4-FFF2-40B4-BE49-F238E27FC236}">
-                  <a16:creationId xmlns:a16="http://schemas.microsoft.com/office/drawing/2014/main" id="{3150B98B-8C81-452C-AA92-7CF5CF0CD7C1}"/>
-                </a:ext>
-              </a:extLst>
-            </p:cNvPr>
-            <p:cNvSpPr txBox="1"/>
-            <p:nvPr/>
-          </p:nvSpPr>
-          <p:spPr>
-            <a:xfrm>
-              <a:off x="1857717" y="3093221"/>
-              <a:ext cx="309700" cy="369332"/>
-            </a:xfrm>
-            <a:prstGeom prst="rect">
-              <a:avLst/>
-            </a:prstGeom>
-            <a:noFill/>
-          </p:spPr>
-          <p:txBody>
-            <a:bodyPr wrap="none" rtlCol="0">
-              <a:spAutoFit/>
-            </a:bodyPr>
-            <a:lstStyle/>
-            <a:p>
-              <a:r>
-                <a:rPr lang="en-AU" dirty="0">
-                  <a:latin typeface="Consolas" panose="020B0609020204030204" pitchFamily="49" charset="0"/>
-                </a:rPr>
-                <a:t>B</a:t>
-              </a:r>
-            </a:p>
-          </p:txBody>
-        </p:sp>
-        <p:sp>
-          <p:nvSpPr>
-            <p:cNvPr id="42" name="TextBox 41">
-              <a:extLst>
-                <a:ext uri="{FF2B5EF4-FFF2-40B4-BE49-F238E27FC236}">
-                  <a16:creationId xmlns:a16="http://schemas.microsoft.com/office/drawing/2014/main" id="{77D88D7C-9178-4E20-A226-7F43C3846302}"/>
-                </a:ext>
-              </a:extLst>
-            </p:cNvPr>
-            <p:cNvSpPr txBox="1"/>
-            <p:nvPr/>
-          </p:nvSpPr>
-          <p:spPr>
-            <a:xfrm>
-              <a:off x="1361095" y="4286134"/>
-              <a:ext cx="309700" cy="369332"/>
-            </a:xfrm>
-            <a:prstGeom prst="rect">
-              <a:avLst/>
-            </a:prstGeom>
-            <a:noFill/>
-          </p:spPr>
-          <p:txBody>
-            <a:bodyPr wrap="none" rtlCol="0">
-              <a:spAutoFit/>
-            </a:bodyPr>
-            <a:lstStyle/>
-            <a:p>
-              <a:r>
-                <a:rPr lang="en-AU" dirty="0">
-                  <a:latin typeface="Consolas" panose="020B0609020204030204" pitchFamily="49" charset="0"/>
-                </a:rPr>
-                <a:t>C</a:t>
-              </a:r>
-            </a:p>
-          </p:txBody>
-        </p:sp>
-        <p:sp>
-          <p:nvSpPr>
-            <p:cNvPr id="43" name="TextBox 42">
-              <a:extLst>
-                <a:ext uri="{FF2B5EF4-FFF2-40B4-BE49-F238E27FC236}">
-                  <a16:creationId xmlns:a16="http://schemas.microsoft.com/office/drawing/2014/main" id="{6B612215-E38D-4B0F-9FED-D70565E6AFDF}"/>
-                </a:ext>
-              </a:extLst>
-            </p:cNvPr>
-            <p:cNvSpPr txBox="1"/>
-            <p:nvPr/>
-          </p:nvSpPr>
-          <p:spPr>
-            <a:xfrm>
-              <a:off x="3106744" y="5209597"/>
-              <a:ext cx="311304" cy="369332"/>
-            </a:xfrm>
-            <a:prstGeom prst="rect">
-              <a:avLst/>
-            </a:prstGeom>
-            <a:noFill/>
-          </p:spPr>
-          <p:txBody>
-            <a:bodyPr wrap="none" rtlCol="0">
-              <a:spAutoFit/>
-            </a:bodyPr>
-            <a:lstStyle/>
-            <a:p>
-              <a:r>
-                <a:rPr lang="en-AU" dirty="0">
-                  <a:latin typeface="Consolas" panose="020B0609020204030204" pitchFamily="49" charset="0"/>
-                </a:rPr>
-                <a:t>D</a:t>
-              </a:r>
-            </a:p>
-          </p:txBody>
-        </p:sp>
-        <p:sp>
-          <p:nvSpPr>
-            <p:cNvPr id="44" name="TextBox 43">
-              <a:extLst>
-                <a:ext uri="{FF2B5EF4-FFF2-40B4-BE49-F238E27FC236}">
-                  <a16:creationId xmlns:a16="http://schemas.microsoft.com/office/drawing/2014/main" id="{F8B091E5-AD1E-422B-B227-8EAC66BF0862}"/>
-                </a:ext>
-              </a:extLst>
-            </p:cNvPr>
-            <p:cNvSpPr txBox="1"/>
-            <p:nvPr/>
-          </p:nvSpPr>
-          <p:spPr>
-            <a:xfrm>
-              <a:off x="3418048" y="2943550"/>
-              <a:ext cx="311304" cy="369332"/>
-            </a:xfrm>
-            <a:prstGeom prst="rect">
-              <a:avLst/>
-            </a:prstGeom>
-            <a:noFill/>
-          </p:spPr>
-          <p:txBody>
-            <a:bodyPr wrap="none" rtlCol="0">
-              <a:spAutoFit/>
-            </a:bodyPr>
-            <a:lstStyle/>
-            <a:p>
-              <a:r>
-                <a:rPr lang="en-AU" dirty="0">
-                  <a:latin typeface="Consolas" panose="020B0609020204030204" pitchFamily="49" charset="0"/>
-                </a:rPr>
-                <a:t>F</a:t>
-              </a:r>
-            </a:p>
-          </p:txBody>
-        </p:sp>
-        <p:sp>
-          <p:nvSpPr>
-            <p:cNvPr id="45" name="Oval 44">
-              <a:extLst>
-                <a:ext uri="{FF2B5EF4-FFF2-40B4-BE49-F238E27FC236}">
-                  <a16:creationId xmlns:a16="http://schemas.microsoft.com/office/drawing/2014/main" id="{AEF49F6A-603A-43E8-96B7-63CCAC054862}"/>
-                </a:ext>
-              </a:extLst>
-            </p:cNvPr>
-            <p:cNvSpPr/>
-            <p:nvPr/>
-          </p:nvSpPr>
-          <p:spPr>
-            <a:xfrm>
-              <a:off x="3080963" y="3076629"/>
-              <a:ext cx="378895" cy="378895"/>
-            </a:xfrm>
-            <a:prstGeom prst="ellipse">
-              <a:avLst/>
-            </a:prstGeom>
-            <a:solidFill>
-              <a:schemeClr val="tx1"/>
-            </a:solidFill>
-            <a:ln>
-              <a:noFill/>
-            </a:ln>
-          </p:spPr>
-          <p:style>
-            <a:lnRef idx="2">
-              <a:schemeClr val="accent1">
-                <a:shade val="50000"/>
-              </a:schemeClr>
-            </a:lnRef>
-            <a:fillRef idx="1">
-              <a:schemeClr val="accent1"/>
-            </a:fillRef>
-            <a:effectRef idx="0">
-              <a:schemeClr val="accent1"/>
-            </a:effectRef>
-            <a:fontRef idx="minor">
-              <a:schemeClr val="lt1"/>
-            </a:fontRef>
-          </p:style>
-          <p:txBody>
-            <a:bodyPr rtlCol="0" anchor="ctr"/>
-            <a:lstStyle/>
-            <a:p>
-              <a:pPr algn="ctr"/>
-              <a:endParaRPr lang="en-AU" dirty="0">
-                <a:latin typeface="Consolas" panose="020B0609020204030204" pitchFamily="49" charset="0"/>
-              </a:endParaRPr>
-            </a:p>
-          </p:txBody>
-        </p:sp>
-        <p:cxnSp>
-          <p:nvCxnSpPr>
-            <p:cNvPr id="47" name="Connector: Elbow 46">
-              <a:extLst>
-                <a:ext uri="{FF2B5EF4-FFF2-40B4-BE49-F238E27FC236}">
-                  <a16:creationId xmlns:a16="http://schemas.microsoft.com/office/drawing/2014/main" id="{A19063E1-0473-44A0-8EF6-3B1A80230128}"/>
-                </a:ext>
-              </a:extLst>
-            </p:cNvPr>
-            <p:cNvCxnSpPr>
-              <a:stCxn id="42" idx="0"/>
-              <a:endCxn id="18" idx="1"/>
-            </p:cNvCxnSpPr>
-            <p:nvPr/>
-          </p:nvCxnSpPr>
-          <p:spPr>
-            <a:xfrm rot="5400000" flipH="1" flipV="1">
-              <a:off x="1555822" y="4016311"/>
-              <a:ext cx="229947" cy="309700"/>
-            </a:xfrm>
-            <a:prstGeom prst="bentConnector2">
-              <a:avLst/>
-            </a:prstGeom>
-            <a:ln>
-              <a:tailEnd type="triangle"/>
-            </a:ln>
-          </p:spPr>
-          <p:style>
-            <a:lnRef idx="3">
-              <a:schemeClr val="accent2"/>
-            </a:lnRef>
-            <a:fillRef idx="0">
-              <a:schemeClr val="accent2"/>
-            </a:fillRef>
-            <a:effectRef idx="2">
-              <a:schemeClr val="accent2"/>
-            </a:effectRef>
-            <a:fontRef idx="minor">
-              <a:schemeClr val="tx1"/>
-            </a:fontRef>
-          </p:style>
-        </p:cxnSp>
-        <p:cxnSp>
-          <p:nvCxnSpPr>
-            <p:cNvPr id="49" name="Connector: Elbow 48">
-              <a:extLst>
-                <a:ext uri="{FF2B5EF4-FFF2-40B4-BE49-F238E27FC236}">
-                  <a16:creationId xmlns:a16="http://schemas.microsoft.com/office/drawing/2014/main" id="{6688A659-5AA7-4D2C-8548-8D8E7D672A64}"/>
-                </a:ext>
-              </a:extLst>
-            </p:cNvPr>
-            <p:cNvCxnSpPr>
-              <a:stCxn id="42" idx="2"/>
-              <a:endCxn id="31" idx="1"/>
-            </p:cNvCxnSpPr>
-            <p:nvPr/>
-          </p:nvCxnSpPr>
-          <p:spPr>
-            <a:xfrm rot="16200000" flipH="1">
-              <a:off x="1523007" y="4648404"/>
-              <a:ext cx="295577" cy="309700"/>
-            </a:xfrm>
-            <a:prstGeom prst="bentConnector2">
-              <a:avLst/>
-            </a:prstGeom>
-            <a:ln>
-              <a:tailEnd type="triangle"/>
-            </a:ln>
-          </p:spPr>
-          <p:style>
-            <a:lnRef idx="3">
-              <a:schemeClr val="accent2"/>
-            </a:lnRef>
-            <a:fillRef idx="0">
-              <a:schemeClr val="accent2"/>
-            </a:fillRef>
-            <a:effectRef idx="2">
-              <a:schemeClr val="accent2"/>
-            </a:effectRef>
-            <a:fontRef idx="minor">
-              <a:schemeClr val="tx1"/>
-            </a:fontRef>
-          </p:style>
-        </p:cxnSp>
-        <p:cxnSp>
-          <p:nvCxnSpPr>
-            <p:cNvPr id="53" name="Connector: Elbow 52">
-              <a:extLst>
-                <a:ext uri="{FF2B5EF4-FFF2-40B4-BE49-F238E27FC236}">
-                  <a16:creationId xmlns:a16="http://schemas.microsoft.com/office/drawing/2014/main" id="{FDE4D337-8D98-4F5A-B7DC-6A18DF0853C9}"/>
-                </a:ext>
-              </a:extLst>
-            </p:cNvPr>
-            <p:cNvCxnSpPr>
-              <a:stCxn id="43" idx="1"/>
-              <a:endCxn id="34" idx="1"/>
-            </p:cNvCxnSpPr>
-            <p:nvPr/>
-          </p:nvCxnSpPr>
-          <p:spPr>
-            <a:xfrm rot="10800000">
-              <a:off x="2331744" y="5069691"/>
-              <a:ext cx="775000" cy="324573"/>
-            </a:xfrm>
-            <a:prstGeom prst="bentConnector2">
-              <a:avLst/>
-            </a:prstGeom>
-            <a:ln>
-              <a:tailEnd type="triangle"/>
-            </a:ln>
-          </p:spPr>
-          <p:style>
-            <a:lnRef idx="3">
-              <a:schemeClr val="accent2"/>
-            </a:lnRef>
-            <a:fillRef idx="0">
-              <a:schemeClr val="accent2"/>
-            </a:fillRef>
-            <a:effectRef idx="2">
-              <a:schemeClr val="accent2"/>
-            </a:effectRef>
-            <a:fontRef idx="minor">
-              <a:schemeClr val="tx1"/>
-            </a:fontRef>
-          </p:style>
-        </p:cxnSp>
-        <p:cxnSp>
-          <p:nvCxnSpPr>
-            <p:cNvPr id="55" name="Connector: Elbow 54">
-              <a:extLst>
-                <a:ext uri="{FF2B5EF4-FFF2-40B4-BE49-F238E27FC236}">
-                  <a16:creationId xmlns:a16="http://schemas.microsoft.com/office/drawing/2014/main" id="{3E95FB2F-4E49-42DF-8AB0-21FA61304F3B}"/>
-                </a:ext>
-              </a:extLst>
-            </p:cNvPr>
-            <p:cNvCxnSpPr>
-              <a:stCxn id="43" idx="3"/>
-              <a:endCxn id="41" idx="5"/>
-            </p:cNvCxnSpPr>
-            <p:nvPr/>
-          </p:nvCxnSpPr>
-          <p:spPr>
-            <a:xfrm flipV="1">
-              <a:off x="3418048" y="5069690"/>
-              <a:ext cx="781499" cy="324573"/>
-            </a:xfrm>
-            <a:prstGeom prst="bentConnector2">
-              <a:avLst/>
-            </a:prstGeom>
-            <a:ln>
-              <a:tailEnd type="triangle"/>
-            </a:ln>
-          </p:spPr>
-          <p:style>
-            <a:lnRef idx="3">
-              <a:schemeClr val="accent2"/>
-            </a:lnRef>
-            <a:fillRef idx="0">
-              <a:schemeClr val="accent2"/>
-            </a:fillRef>
-            <a:effectRef idx="2">
-              <a:schemeClr val="accent2"/>
-            </a:effectRef>
-            <a:fontRef idx="minor">
-              <a:schemeClr val="tx1"/>
-            </a:fontRef>
-          </p:style>
-        </p:cxnSp>
-      </p:grpSp>
-    </p:spTree>
-    <p:extLst>
-      <p:ext uri="{BB962C8B-B14F-4D97-AF65-F5344CB8AC3E}">
-        <p14:creationId xmlns:p14="http://schemas.microsoft.com/office/powerpoint/2010/main" val="1276795312"/>
       </p:ext>
     </p:extLst>
   </p:cSld>

</xml_diff>